<commit_message>
A couple of small tweaks to the walkthrough and gitignore and revamp of the slides for updated version of the talk
</commit_message>
<xml_diff>
--- a/IntroductionToIoT.pptx
+++ b/IntroductionToIoT.pptx
@@ -5,7 +5,7 @@
     <p:sldMasterId id="2147483648" r:id="rId1"/>
   </p:sldMasterIdLst>
   <p:notesMasterIdLst>
-    <p:notesMasterId r:id="rId24"/>
+    <p:notesMasterId r:id="rId29"/>
   </p:notesMasterIdLst>
   <p:sldIdLst>
     <p:sldId id="256" r:id="rId2"/>
@@ -15,21 +15,26 @@
     <p:sldId id="336" r:id="rId6"/>
     <p:sldId id="338" r:id="rId7"/>
     <p:sldId id="339" r:id="rId8"/>
-    <p:sldId id="340" r:id="rId9"/>
-    <p:sldId id="332" r:id="rId10"/>
-    <p:sldId id="341" r:id="rId11"/>
-    <p:sldId id="342" r:id="rId12"/>
-    <p:sldId id="333" r:id="rId13"/>
-    <p:sldId id="344" r:id="rId14"/>
-    <p:sldId id="343" r:id="rId15"/>
-    <p:sldId id="335" r:id="rId16"/>
-    <p:sldId id="345" r:id="rId17"/>
-    <p:sldId id="346" r:id="rId18"/>
-    <p:sldId id="337" r:id="rId19"/>
-    <p:sldId id="347" r:id="rId20"/>
-    <p:sldId id="328" r:id="rId21"/>
-    <p:sldId id="330" r:id="rId22"/>
-    <p:sldId id="329" r:id="rId23"/>
+    <p:sldId id="353" r:id="rId9"/>
+    <p:sldId id="340" r:id="rId10"/>
+    <p:sldId id="332" r:id="rId11"/>
+    <p:sldId id="341" r:id="rId12"/>
+    <p:sldId id="342" r:id="rId13"/>
+    <p:sldId id="333" r:id="rId14"/>
+    <p:sldId id="344" r:id="rId15"/>
+    <p:sldId id="343" r:id="rId16"/>
+    <p:sldId id="335" r:id="rId17"/>
+    <p:sldId id="345" r:id="rId18"/>
+    <p:sldId id="346" r:id="rId19"/>
+    <p:sldId id="337" r:id="rId20"/>
+    <p:sldId id="347" r:id="rId21"/>
+    <p:sldId id="348" r:id="rId22"/>
+    <p:sldId id="349" r:id="rId23"/>
+    <p:sldId id="352" r:id="rId24"/>
+    <p:sldId id="351" r:id="rId25"/>
+    <p:sldId id="328" r:id="rId26"/>
+    <p:sldId id="330" r:id="rId27"/>
+    <p:sldId id="329" r:id="rId28"/>
   </p:sldIdLst>
   <p:sldSz cx="12192000" cy="6858000"/>
   <p:notesSz cx="6858000" cy="9144000"/>
@@ -144,6 +149,7 @@
             <p14:sldId id="336"/>
             <p14:sldId id="338"/>
             <p14:sldId id="339"/>
+            <p14:sldId id="353"/>
             <p14:sldId id="340"/>
           </p14:sldIdLst>
         </p14:section>
@@ -172,6 +178,14 @@
           <p14:sldIdLst>
             <p14:sldId id="337"/>
             <p14:sldId id="347"/>
+          </p14:sldIdLst>
+        </p14:section>
+        <p14:section name="Live Telemetry" id="{52CA88BD-4F50-40E9-9966-08B7DCF6951F}">
+          <p14:sldIdLst>
+            <p14:sldId id="348"/>
+            <p14:sldId id="349"/>
+            <p14:sldId id="352"/>
+            <p14:sldId id="351"/>
           </p14:sldIdLst>
         </p14:section>
         <p14:section name="Conclusion" id="{32CD27A0-5309-48BE-8171-00F60B04E7FE}">
@@ -272,7 +286,7 @@
           <a:p>
             <a:fld id="{EC6E915F-729B-41B5-9E60-B75A98DB1B95}" type="datetimeFigureOut">
               <a:rPr lang="en-US" smtClean="0"/>
-              <a:t>4/6/2022</a:t>
+              <a:t>6/21/2022</a:t>
             </a:fld>
             <a:endParaRPr lang="en-US"/>
           </a:p>
@@ -700,7 +714,7 @@
           <a:p>
             <a:fld id="{8C2E9449-D161-4234-AF44-56BC19BD5257}" type="slidenum">
               <a:rPr lang="en-US" smtClean="0"/>
-              <a:t>17</a:t>
+              <a:t>11</a:t>
             </a:fld>
             <a:endParaRPr lang="en-US"/>
           </a:p>
@@ -709,7 +723,7 @@
     </p:spTree>
     <p:extLst>
       <p:ext uri="{BB962C8B-B14F-4D97-AF65-F5344CB8AC3E}">
-        <p14:creationId xmlns:p14="http://schemas.microsoft.com/office/powerpoint/2010/main" val="2401180954"/>
+        <p14:creationId xmlns:p14="http://schemas.microsoft.com/office/powerpoint/2010/main" val="4052062856"/>
       </p:ext>
     </p:extLst>
   </p:cSld>
@@ -784,7 +798,7 @@
           <a:p>
             <a:fld id="{8C2E9449-D161-4234-AF44-56BC19BD5257}" type="slidenum">
               <a:rPr lang="en-US" smtClean="0"/>
-              <a:t>18</a:t>
+              <a:t>12</a:t>
             </a:fld>
             <a:endParaRPr lang="en-US"/>
           </a:p>
@@ -793,7 +807,7 @@
     </p:spTree>
     <p:extLst>
       <p:ext uri="{BB962C8B-B14F-4D97-AF65-F5344CB8AC3E}">
-        <p14:creationId xmlns:p14="http://schemas.microsoft.com/office/powerpoint/2010/main" val="579729636"/>
+        <p14:creationId xmlns:p14="http://schemas.microsoft.com/office/powerpoint/2010/main" val="3110967491"/>
       </p:ext>
     </p:extLst>
   </p:cSld>
@@ -868,7 +882,7 @@
           <a:p>
             <a:fld id="{8C2E9449-D161-4234-AF44-56BC19BD5257}" type="slidenum">
               <a:rPr lang="en-US" smtClean="0"/>
-              <a:t>19</a:t>
+              <a:t>18</a:t>
             </a:fld>
             <a:endParaRPr lang="en-US"/>
           </a:p>
@@ -877,7 +891,7 @@
     </p:spTree>
     <p:extLst>
       <p:ext uri="{BB962C8B-B14F-4D97-AF65-F5344CB8AC3E}">
-        <p14:creationId xmlns:p14="http://schemas.microsoft.com/office/powerpoint/2010/main" val="907941927"/>
+        <p14:creationId xmlns:p14="http://schemas.microsoft.com/office/powerpoint/2010/main" val="2401180954"/>
       </p:ext>
     </p:extLst>
   </p:cSld>
@@ -952,7 +966,7 @@
           <a:p>
             <a:fld id="{8C2E9449-D161-4234-AF44-56BC19BD5257}" type="slidenum">
               <a:rPr lang="en-US" smtClean="0"/>
-              <a:t>20</a:t>
+              <a:t>19</a:t>
             </a:fld>
             <a:endParaRPr lang="en-US"/>
           </a:p>
@@ -961,7 +975,7 @@
     </p:spTree>
     <p:extLst>
       <p:ext uri="{BB962C8B-B14F-4D97-AF65-F5344CB8AC3E}">
-        <p14:creationId xmlns:p14="http://schemas.microsoft.com/office/powerpoint/2010/main" val="1769176276"/>
+        <p14:creationId xmlns:p14="http://schemas.microsoft.com/office/powerpoint/2010/main" val="579729636"/>
       </p:ext>
     </p:extLst>
   </p:cSld>
@@ -1036,7 +1050,7 @@
           <a:p>
             <a:fld id="{8C2E9449-D161-4234-AF44-56BC19BD5257}" type="slidenum">
               <a:rPr lang="en-US" smtClean="0"/>
-              <a:t>21</a:t>
+              <a:t>20</a:t>
             </a:fld>
             <a:endParaRPr lang="en-US"/>
           </a:p>
@@ -1045,7 +1059,7 @@
     </p:spTree>
     <p:extLst>
       <p:ext uri="{BB962C8B-B14F-4D97-AF65-F5344CB8AC3E}">
-        <p14:creationId xmlns:p14="http://schemas.microsoft.com/office/powerpoint/2010/main" val="1009367226"/>
+        <p14:creationId xmlns:p14="http://schemas.microsoft.com/office/powerpoint/2010/main" val="907941927"/>
       </p:ext>
     </p:extLst>
   </p:cSld>
@@ -1099,49 +1113,6 @@
           <a:bodyPr/>
           <a:lstStyle/>
           <a:p>
-            <a:r>
-              <a:rPr lang="en-US" dirty="0"/>
-              <a:t>Thank you for attending my talk today.  Please reach out and connect. </a:t>
-            </a:r>
-          </a:p>
-          <a:p>
-            <a:endParaRPr lang="en-US" dirty="0"/>
-          </a:p>
-          <a:p>
-            <a:r>
-              <a:rPr lang="en-US" dirty="0"/>
-              <a:t>If you liked the talk today, you can support me by listening to one or more of my songs on </a:t>
-            </a:r>
-            <a:r>
-              <a:rPr lang="en-US" dirty="0" err="1"/>
-              <a:t>spotify</a:t>
-            </a:r>
-            <a:r>
-              <a:rPr lang="en-US" dirty="0"/>
-              <a:t> </a:t>
-            </a:r>
-            <a:r>
-              <a:rPr lang="en-US" dirty="0">
-                <a:sym typeface="Wingdings" panose="05000000000000000000" pitchFamily="2" charset="2"/>
-              </a:rPr>
-              <a:t></a:t>
-            </a:r>
-            <a:br>
-              <a:rPr lang="en-US" dirty="0">
-                <a:sym typeface="Wingdings" panose="05000000000000000000" pitchFamily="2" charset="2"/>
-              </a:rPr>
-            </a:br>
-            <a:endParaRPr lang="en-US" dirty="0">
-              <a:sym typeface="Wingdings" panose="05000000000000000000" pitchFamily="2" charset="2"/>
-            </a:endParaRPr>
-          </a:p>
-          <a:p>
-            <a:r>
-              <a:rPr lang="en-US" dirty="0"/>
-              <a:t>Enjoy the rest of your conference!</a:t>
-            </a:r>
-          </a:p>
-          <a:p>
             <a:endParaRPr lang="en-US" dirty="0"/>
           </a:p>
         </p:txBody>
@@ -1163,7 +1134,7 @@
           <a:p>
             <a:fld id="{8C2E9449-D161-4234-AF44-56BC19BD5257}" type="slidenum">
               <a:rPr lang="en-US" smtClean="0"/>
-              <a:t>22</a:t>
+              <a:t>21</a:t>
             </a:fld>
             <a:endParaRPr lang="en-US"/>
           </a:p>
@@ -1172,7 +1143,346 @@
     </p:spTree>
     <p:extLst>
       <p:ext uri="{BB962C8B-B14F-4D97-AF65-F5344CB8AC3E}">
-        <p14:creationId xmlns:p14="http://schemas.microsoft.com/office/powerpoint/2010/main" val="4169632679"/>
+        <p14:creationId xmlns:p14="http://schemas.microsoft.com/office/powerpoint/2010/main" val="2376290245"/>
+      </p:ext>
+    </p:extLst>
+  </p:cSld>
+  <p:clrMapOvr>
+    <a:masterClrMapping/>
+  </p:clrMapOvr>
+</p:notes>
+</file>
+
+<file path=ppt/notesSlides/notesSlide16.xml><?xml version="1.0" encoding="utf-8"?>
+<p:notes xmlns:a="http://schemas.openxmlformats.org/drawingml/2006/main" xmlns:r="http://schemas.openxmlformats.org/officeDocument/2006/relationships" xmlns:p="http://schemas.openxmlformats.org/presentationml/2006/main">
+  <p:cSld>
+    <p:spTree>
+      <p:nvGrpSpPr>
+        <p:cNvPr id="1" name=""/>
+        <p:cNvGrpSpPr/>
+        <p:nvPr/>
+      </p:nvGrpSpPr>
+      <p:grpSpPr>
+        <a:xfrm>
+          <a:off x="0" y="0"/>
+          <a:ext cx="0" cy="0"/>
+          <a:chOff x="0" y="0"/>
+          <a:chExt cx="0" cy="0"/>
+        </a:xfrm>
+      </p:grpSpPr>
+      <p:sp>
+        <p:nvSpPr>
+          <p:cNvPr id="2" name="Slide Image Placeholder 1"/>
+          <p:cNvSpPr>
+            <a:spLocks noGrp="1" noRot="1" noChangeAspect="1"/>
+          </p:cNvSpPr>
+          <p:nvPr>
+            <p:ph type="sldImg"/>
+          </p:nvPr>
+        </p:nvSpPr>
+        <p:spPr/>
+      </p:sp>
+      <p:sp>
+        <p:nvSpPr>
+          <p:cNvPr id="3" name="Notes Placeholder 2"/>
+          <p:cNvSpPr>
+            <a:spLocks noGrp="1"/>
+          </p:cNvSpPr>
+          <p:nvPr>
+            <p:ph type="body" idx="1"/>
+          </p:nvPr>
+        </p:nvSpPr>
+        <p:spPr/>
+        <p:txBody>
+          <a:bodyPr/>
+          <a:lstStyle/>
+          <a:p>
+            <a:endParaRPr lang="en-US" dirty="0"/>
+          </a:p>
+        </p:txBody>
+      </p:sp>
+      <p:sp>
+        <p:nvSpPr>
+          <p:cNvPr id="4" name="Slide Number Placeholder 3"/>
+          <p:cNvSpPr>
+            <a:spLocks noGrp="1"/>
+          </p:cNvSpPr>
+          <p:nvPr>
+            <p:ph type="sldNum" sz="quarter" idx="5"/>
+          </p:nvPr>
+        </p:nvSpPr>
+        <p:spPr/>
+        <p:txBody>
+          <a:bodyPr/>
+          <a:lstStyle/>
+          <a:p>
+            <a:fld id="{8C2E9449-D161-4234-AF44-56BC19BD5257}" type="slidenum">
+              <a:rPr lang="en-US" smtClean="0"/>
+              <a:t>22</a:t>
+            </a:fld>
+            <a:endParaRPr lang="en-US"/>
+          </a:p>
+        </p:txBody>
+      </p:sp>
+    </p:spTree>
+    <p:extLst>
+      <p:ext uri="{BB962C8B-B14F-4D97-AF65-F5344CB8AC3E}">
+        <p14:creationId xmlns:p14="http://schemas.microsoft.com/office/powerpoint/2010/main" val="3751232605"/>
+      </p:ext>
+    </p:extLst>
+  </p:cSld>
+  <p:clrMapOvr>
+    <a:masterClrMapping/>
+  </p:clrMapOvr>
+</p:notes>
+</file>
+
+<file path=ppt/notesSlides/notesSlide17.xml><?xml version="1.0" encoding="utf-8"?>
+<p:notes xmlns:a="http://schemas.openxmlformats.org/drawingml/2006/main" xmlns:r="http://schemas.openxmlformats.org/officeDocument/2006/relationships" xmlns:p="http://schemas.openxmlformats.org/presentationml/2006/main">
+  <p:cSld>
+    <p:spTree>
+      <p:nvGrpSpPr>
+        <p:cNvPr id="1" name=""/>
+        <p:cNvGrpSpPr/>
+        <p:nvPr/>
+      </p:nvGrpSpPr>
+      <p:grpSpPr>
+        <a:xfrm>
+          <a:off x="0" y="0"/>
+          <a:ext cx="0" cy="0"/>
+          <a:chOff x="0" y="0"/>
+          <a:chExt cx="0" cy="0"/>
+        </a:xfrm>
+      </p:grpSpPr>
+      <p:sp>
+        <p:nvSpPr>
+          <p:cNvPr id="2" name="Slide Image Placeholder 1"/>
+          <p:cNvSpPr>
+            <a:spLocks noGrp="1" noRot="1" noChangeAspect="1"/>
+          </p:cNvSpPr>
+          <p:nvPr>
+            <p:ph type="sldImg"/>
+          </p:nvPr>
+        </p:nvSpPr>
+        <p:spPr/>
+      </p:sp>
+      <p:sp>
+        <p:nvSpPr>
+          <p:cNvPr id="3" name="Notes Placeholder 2"/>
+          <p:cNvSpPr>
+            <a:spLocks noGrp="1"/>
+          </p:cNvSpPr>
+          <p:nvPr>
+            <p:ph type="body" idx="1"/>
+          </p:nvPr>
+        </p:nvSpPr>
+        <p:spPr/>
+        <p:txBody>
+          <a:bodyPr/>
+          <a:lstStyle/>
+          <a:p>
+            <a:endParaRPr lang="en-US" dirty="0"/>
+          </a:p>
+        </p:txBody>
+      </p:sp>
+      <p:sp>
+        <p:nvSpPr>
+          <p:cNvPr id="4" name="Slide Number Placeholder 3"/>
+          <p:cNvSpPr>
+            <a:spLocks noGrp="1"/>
+          </p:cNvSpPr>
+          <p:nvPr>
+            <p:ph type="sldNum" sz="quarter" idx="5"/>
+          </p:nvPr>
+        </p:nvSpPr>
+        <p:spPr/>
+        <p:txBody>
+          <a:bodyPr/>
+          <a:lstStyle/>
+          <a:p>
+            <a:fld id="{8C2E9449-D161-4234-AF44-56BC19BD5257}" type="slidenum">
+              <a:rPr lang="en-US" smtClean="0"/>
+              <a:t>23</a:t>
+            </a:fld>
+            <a:endParaRPr lang="en-US"/>
+          </a:p>
+        </p:txBody>
+      </p:sp>
+    </p:spTree>
+    <p:extLst>
+      <p:ext uri="{BB962C8B-B14F-4D97-AF65-F5344CB8AC3E}">
+        <p14:creationId xmlns:p14="http://schemas.microsoft.com/office/powerpoint/2010/main" val="4130651777"/>
+      </p:ext>
+    </p:extLst>
+  </p:cSld>
+  <p:clrMapOvr>
+    <a:masterClrMapping/>
+  </p:clrMapOvr>
+</p:notes>
+</file>
+
+<file path=ppt/notesSlides/notesSlide18.xml><?xml version="1.0" encoding="utf-8"?>
+<p:notes xmlns:a="http://schemas.openxmlformats.org/drawingml/2006/main" xmlns:r="http://schemas.openxmlformats.org/officeDocument/2006/relationships" xmlns:p="http://schemas.openxmlformats.org/presentationml/2006/main">
+  <p:cSld>
+    <p:spTree>
+      <p:nvGrpSpPr>
+        <p:cNvPr id="1" name=""/>
+        <p:cNvGrpSpPr/>
+        <p:nvPr/>
+      </p:nvGrpSpPr>
+      <p:grpSpPr>
+        <a:xfrm>
+          <a:off x="0" y="0"/>
+          <a:ext cx="0" cy="0"/>
+          <a:chOff x="0" y="0"/>
+          <a:chExt cx="0" cy="0"/>
+        </a:xfrm>
+      </p:grpSpPr>
+      <p:sp>
+        <p:nvSpPr>
+          <p:cNvPr id="2" name="Slide Image Placeholder 1"/>
+          <p:cNvSpPr>
+            <a:spLocks noGrp="1" noRot="1" noChangeAspect="1"/>
+          </p:cNvSpPr>
+          <p:nvPr>
+            <p:ph type="sldImg"/>
+          </p:nvPr>
+        </p:nvSpPr>
+        <p:spPr/>
+      </p:sp>
+      <p:sp>
+        <p:nvSpPr>
+          <p:cNvPr id="3" name="Notes Placeholder 2"/>
+          <p:cNvSpPr>
+            <a:spLocks noGrp="1"/>
+          </p:cNvSpPr>
+          <p:nvPr>
+            <p:ph type="body" idx="1"/>
+          </p:nvPr>
+        </p:nvSpPr>
+        <p:spPr/>
+        <p:txBody>
+          <a:bodyPr/>
+          <a:lstStyle/>
+          <a:p>
+            <a:r>
+              <a:rPr lang="en-US" dirty="0"/>
+              <a:t>To make this easy, my code connects via a simple device connection string.</a:t>
+            </a:r>
+          </a:p>
+        </p:txBody>
+      </p:sp>
+      <p:sp>
+        <p:nvSpPr>
+          <p:cNvPr id="4" name="Slide Number Placeholder 3"/>
+          <p:cNvSpPr>
+            <a:spLocks noGrp="1"/>
+          </p:cNvSpPr>
+          <p:nvPr>
+            <p:ph type="sldNum" sz="quarter" idx="5"/>
+          </p:nvPr>
+        </p:nvSpPr>
+        <p:spPr/>
+        <p:txBody>
+          <a:bodyPr/>
+          <a:lstStyle/>
+          <a:p>
+            <a:fld id="{8C2E9449-D161-4234-AF44-56BC19BD5257}" type="slidenum">
+              <a:rPr lang="en-US" smtClean="0"/>
+              <a:t>24</a:t>
+            </a:fld>
+            <a:endParaRPr lang="en-US"/>
+          </a:p>
+        </p:txBody>
+      </p:sp>
+    </p:spTree>
+    <p:extLst>
+      <p:ext uri="{BB962C8B-B14F-4D97-AF65-F5344CB8AC3E}">
+        <p14:creationId xmlns:p14="http://schemas.microsoft.com/office/powerpoint/2010/main" val="56018897"/>
+      </p:ext>
+    </p:extLst>
+  </p:cSld>
+  <p:clrMapOvr>
+    <a:masterClrMapping/>
+  </p:clrMapOvr>
+</p:notes>
+</file>
+
+<file path=ppt/notesSlides/notesSlide19.xml><?xml version="1.0" encoding="utf-8"?>
+<p:notes xmlns:a="http://schemas.openxmlformats.org/drawingml/2006/main" xmlns:r="http://schemas.openxmlformats.org/officeDocument/2006/relationships" xmlns:p="http://schemas.openxmlformats.org/presentationml/2006/main">
+  <p:cSld>
+    <p:spTree>
+      <p:nvGrpSpPr>
+        <p:cNvPr id="1" name=""/>
+        <p:cNvGrpSpPr/>
+        <p:nvPr/>
+      </p:nvGrpSpPr>
+      <p:grpSpPr>
+        <a:xfrm>
+          <a:off x="0" y="0"/>
+          <a:ext cx="0" cy="0"/>
+          <a:chOff x="0" y="0"/>
+          <a:chExt cx="0" cy="0"/>
+        </a:xfrm>
+      </p:grpSpPr>
+      <p:sp>
+        <p:nvSpPr>
+          <p:cNvPr id="2" name="Slide Image Placeholder 1"/>
+          <p:cNvSpPr>
+            <a:spLocks noGrp="1" noRot="1" noChangeAspect="1"/>
+          </p:cNvSpPr>
+          <p:nvPr>
+            <p:ph type="sldImg"/>
+          </p:nvPr>
+        </p:nvSpPr>
+        <p:spPr/>
+      </p:sp>
+      <p:sp>
+        <p:nvSpPr>
+          <p:cNvPr id="3" name="Notes Placeholder 2"/>
+          <p:cNvSpPr>
+            <a:spLocks noGrp="1"/>
+          </p:cNvSpPr>
+          <p:nvPr>
+            <p:ph type="body" idx="1"/>
+          </p:nvPr>
+        </p:nvSpPr>
+        <p:spPr/>
+        <p:txBody>
+          <a:bodyPr/>
+          <a:lstStyle/>
+          <a:p>
+            <a:endParaRPr lang="en-US" dirty="0"/>
+          </a:p>
+        </p:txBody>
+      </p:sp>
+      <p:sp>
+        <p:nvSpPr>
+          <p:cNvPr id="4" name="Slide Number Placeholder 3"/>
+          <p:cNvSpPr>
+            <a:spLocks noGrp="1"/>
+          </p:cNvSpPr>
+          <p:nvPr>
+            <p:ph type="sldNum" sz="quarter" idx="5"/>
+          </p:nvPr>
+        </p:nvSpPr>
+        <p:spPr/>
+        <p:txBody>
+          <a:bodyPr/>
+          <a:lstStyle/>
+          <a:p>
+            <a:fld id="{8C2E9449-D161-4234-AF44-56BC19BD5257}" type="slidenum">
+              <a:rPr lang="en-US" smtClean="0"/>
+              <a:t>25</a:t>
+            </a:fld>
+            <a:endParaRPr lang="en-US"/>
+          </a:p>
+        </p:txBody>
+      </p:sp>
+    </p:spTree>
+    <p:extLst>
+      <p:ext uri="{BB962C8B-B14F-4D97-AF65-F5344CB8AC3E}">
+        <p14:creationId xmlns:p14="http://schemas.microsoft.com/office/powerpoint/2010/main" val="1769176276"/>
       </p:ext>
     </p:extLst>
   </p:cSld>
@@ -1365,6 +1675,217 @@
     <p:extLst>
       <p:ext uri="{BB962C8B-B14F-4D97-AF65-F5344CB8AC3E}">
         <p14:creationId xmlns:p14="http://schemas.microsoft.com/office/powerpoint/2010/main" val="768980581"/>
+      </p:ext>
+    </p:extLst>
+  </p:cSld>
+  <p:clrMapOvr>
+    <a:masterClrMapping/>
+  </p:clrMapOvr>
+</p:notes>
+</file>
+
+<file path=ppt/notesSlides/notesSlide20.xml><?xml version="1.0" encoding="utf-8"?>
+<p:notes xmlns:a="http://schemas.openxmlformats.org/drawingml/2006/main" xmlns:r="http://schemas.openxmlformats.org/officeDocument/2006/relationships" xmlns:p="http://schemas.openxmlformats.org/presentationml/2006/main">
+  <p:cSld>
+    <p:spTree>
+      <p:nvGrpSpPr>
+        <p:cNvPr id="1" name=""/>
+        <p:cNvGrpSpPr/>
+        <p:nvPr/>
+      </p:nvGrpSpPr>
+      <p:grpSpPr>
+        <a:xfrm>
+          <a:off x="0" y="0"/>
+          <a:ext cx="0" cy="0"/>
+          <a:chOff x="0" y="0"/>
+          <a:chExt cx="0" cy="0"/>
+        </a:xfrm>
+      </p:grpSpPr>
+      <p:sp>
+        <p:nvSpPr>
+          <p:cNvPr id="2" name="Slide Image Placeholder 1"/>
+          <p:cNvSpPr>
+            <a:spLocks noGrp="1" noRot="1" noChangeAspect="1"/>
+          </p:cNvSpPr>
+          <p:nvPr>
+            <p:ph type="sldImg"/>
+          </p:nvPr>
+        </p:nvSpPr>
+        <p:spPr/>
+      </p:sp>
+      <p:sp>
+        <p:nvSpPr>
+          <p:cNvPr id="3" name="Notes Placeholder 2"/>
+          <p:cNvSpPr>
+            <a:spLocks noGrp="1"/>
+          </p:cNvSpPr>
+          <p:nvPr>
+            <p:ph type="body" idx="1"/>
+          </p:nvPr>
+        </p:nvSpPr>
+        <p:spPr/>
+        <p:txBody>
+          <a:bodyPr/>
+          <a:lstStyle/>
+          <a:p>
+            <a:endParaRPr lang="en-US" dirty="0"/>
+          </a:p>
+        </p:txBody>
+      </p:sp>
+      <p:sp>
+        <p:nvSpPr>
+          <p:cNvPr id="4" name="Slide Number Placeholder 3"/>
+          <p:cNvSpPr>
+            <a:spLocks noGrp="1"/>
+          </p:cNvSpPr>
+          <p:nvPr>
+            <p:ph type="sldNum" sz="quarter" idx="5"/>
+          </p:nvPr>
+        </p:nvSpPr>
+        <p:spPr/>
+        <p:txBody>
+          <a:bodyPr/>
+          <a:lstStyle/>
+          <a:p>
+            <a:fld id="{8C2E9449-D161-4234-AF44-56BC19BD5257}" type="slidenum">
+              <a:rPr lang="en-US" smtClean="0"/>
+              <a:t>26</a:t>
+            </a:fld>
+            <a:endParaRPr lang="en-US"/>
+          </a:p>
+        </p:txBody>
+      </p:sp>
+    </p:spTree>
+    <p:extLst>
+      <p:ext uri="{BB962C8B-B14F-4D97-AF65-F5344CB8AC3E}">
+        <p14:creationId xmlns:p14="http://schemas.microsoft.com/office/powerpoint/2010/main" val="1009367226"/>
+      </p:ext>
+    </p:extLst>
+  </p:cSld>
+  <p:clrMapOvr>
+    <a:masterClrMapping/>
+  </p:clrMapOvr>
+</p:notes>
+</file>
+
+<file path=ppt/notesSlides/notesSlide21.xml><?xml version="1.0" encoding="utf-8"?>
+<p:notes xmlns:a="http://schemas.openxmlformats.org/drawingml/2006/main" xmlns:r="http://schemas.openxmlformats.org/officeDocument/2006/relationships" xmlns:p="http://schemas.openxmlformats.org/presentationml/2006/main">
+  <p:cSld>
+    <p:spTree>
+      <p:nvGrpSpPr>
+        <p:cNvPr id="1" name=""/>
+        <p:cNvGrpSpPr/>
+        <p:nvPr/>
+      </p:nvGrpSpPr>
+      <p:grpSpPr>
+        <a:xfrm>
+          <a:off x="0" y="0"/>
+          <a:ext cx="0" cy="0"/>
+          <a:chOff x="0" y="0"/>
+          <a:chExt cx="0" cy="0"/>
+        </a:xfrm>
+      </p:grpSpPr>
+      <p:sp>
+        <p:nvSpPr>
+          <p:cNvPr id="2" name="Slide Image Placeholder 1"/>
+          <p:cNvSpPr>
+            <a:spLocks noGrp="1" noRot="1" noChangeAspect="1"/>
+          </p:cNvSpPr>
+          <p:nvPr>
+            <p:ph type="sldImg"/>
+          </p:nvPr>
+        </p:nvSpPr>
+        <p:spPr/>
+      </p:sp>
+      <p:sp>
+        <p:nvSpPr>
+          <p:cNvPr id="3" name="Notes Placeholder 2"/>
+          <p:cNvSpPr>
+            <a:spLocks noGrp="1"/>
+          </p:cNvSpPr>
+          <p:nvPr>
+            <p:ph type="body" idx="1"/>
+          </p:nvPr>
+        </p:nvSpPr>
+        <p:spPr/>
+        <p:txBody>
+          <a:bodyPr/>
+          <a:lstStyle/>
+          <a:p>
+            <a:r>
+              <a:rPr lang="en-US" dirty="0"/>
+              <a:t>Thank you for attending my talk today.  Please reach out and connect. </a:t>
+            </a:r>
+          </a:p>
+          <a:p>
+            <a:endParaRPr lang="en-US" dirty="0"/>
+          </a:p>
+          <a:p>
+            <a:r>
+              <a:rPr lang="en-US" dirty="0"/>
+              <a:t>If you liked the talk today, you can support me by listening to one or more of my songs on </a:t>
+            </a:r>
+            <a:r>
+              <a:rPr lang="en-US" dirty="0" err="1"/>
+              <a:t>spotify</a:t>
+            </a:r>
+            <a:r>
+              <a:rPr lang="en-US" dirty="0"/>
+              <a:t> </a:t>
+            </a:r>
+            <a:r>
+              <a:rPr lang="en-US" dirty="0">
+                <a:sym typeface="Wingdings" panose="05000000000000000000" pitchFamily="2" charset="2"/>
+              </a:rPr>
+              <a:t></a:t>
+            </a:r>
+            <a:br>
+              <a:rPr lang="en-US" dirty="0">
+                <a:sym typeface="Wingdings" panose="05000000000000000000" pitchFamily="2" charset="2"/>
+              </a:rPr>
+            </a:br>
+            <a:endParaRPr lang="en-US" dirty="0">
+              <a:sym typeface="Wingdings" panose="05000000000000000000" pitchFamily="2" charset="2"/>
+            </a:endParaRPr>
+          </a:p>
+          <a:p>
+            <a:r>
+              <a:rPr lang="en-US" dirty="0"/>
+              <a:t>Enjoy the rest of your conference!</a:t>
+            </a:r>
+          </a:p>
+          <a:p>
+            <a:endParaRPr lang="en-US" dirty="0"/>
+          </a:p>
+        </p:txBody>
+      </p:sp>
+      <p:sp>
+        <p:nvSpPr>
+          <p:cNvPr id="4" name="Slide Number Placeholder 3"/>
+          <p:cNvSpPr>
+            <a:spLocks noGrp="1"/>
+          </p:cNvSpPr>
+          <p:nvPr>
+            <p:ph type="sldNum" sz="quarter" idx="5"/>
+          </p:nvPr>
+        </p:nvSpPr>
+        <p:spPr/>
+        <p:txBody>
+          <a:bodyPr/>
+          <a:lstStyle/>
+          <a:p>
+            <a:fld id="{8C2E9449-D161-4234-AF44-56BC19BD5257}" type="slidenum">
+              <a:rPr lang="en-US" smtClean="0"/>
+              <a:t>27</a:t>
+            </a:fld>
+            <a:endParaRPr lang="en-US"/>
+          </a:p>
+        </p:txBody>
+      </p:sp>
+    </p:spTree>
+    <p:extLst>
+      <p:ext uri="{BB962C8B-B14F-4D97-AF65-F5344CB8AC3E}">
+        <p14:creationId xmlns:p14="http://schemas.microsoft.com/office/powerpoint/2010/main" val="4169632679"/>
       </p:ext>
     </p:extLst>
   </p:cSld>
@@ -1655,7 +2176,10 @@
           <a:bodyPr/>
           <a:lstStyle/>
           <a:p>
-            <a:endParaRPr lang="en-US" dirty="0"/>
+            <a:r>
+              <a:rPr lang="en-US" dirty="0"/>
+              <a:t>Mention in the interest of time that this is pre-created</a:t>
+            </a:r>
           </a:p>
         </p:txBody>
       </p:sp>
@@ -1856,7 +2380,7 @@
     </p:spTree>
     <p:extLst>
       <p:ext uri="{BB962C8B-B14F-4D97-AF65-F5344CB8AC3E}">
-        <p14:creationId xmlns:p14="http://schemas.microsoft.com/office/powerpoint/2010/main" val="613425331"/>
+        <p14:creationId xmlns:p14="http://schemas.microsoft.com/office/powerpoint/2010/main" val="1585082212"/>
       </p:ext>
     </p:extLst>
   </p:cSld>
@@ -1910,6 +2434,14 @@
           <a:bodyPr/>
           <a:lstStyle/>
           <a:p>
+            <a:r>
+              <a:rPr lang="en-US" dirty="0"/>
+              <a:t>Walk through the device at the IoT Hub and the connection string for the device.  Use the simulator to show telemetry being </a:t>
+            </a:r>
+            <a:r>
+              <a:rPr lang="en-US" dirty="0" err="1"/>
+              <a:t>injested</a:t>
+            </a:r>
             <a:endParaRPr lang="en-US" dirty="0"/>
           </a:p>
         </p:txBody>
@@ -1931,7 +2463,7 @@
           <a:p>
             <a:fld id="{8C2E9449-D161-4234-AF44-56BC19BD5257}" type="slidenum">
               <a:rPr lang="en-US" smtClean="0"/>
-              <a:t>10</a:t>
+              <a:t>9</a:t>
             </a:fld>
             <a:endParaRPr lang="en-US"/>
           </a:p>
@@ -1940,7 +2472,7 @@
     </p:spTree>
     <p:extLst>
       <p:ext uri="{BB962C8B-B14F-4D97-AF65-F5344CB8AC3E}">
-        <p14:creationId xmlns:p14="http://schemas.microsoft.com/office/powerpoint/2010/main" val="4052062856"/>
+        <p14:creationId xmlns:p14="http://schemas.microsoft.com/office/powerpoint/2010/main" val="613425331"/>
       </p:ext>
     </p:extLst>
   </p:cSld>
@@ -2015,7 +2547,7 @@
           <a:p>
             <a:fld id="{8C2E9449-D161-4234-AF44-56BC19BD5257}" type="slidenum">
               <a:rPr lang="en-US" smtClean="0"/>
-              <a:t>11</a:t>
+              <a:t>10</a:t>
             </a:fld>
             <a:endParaRPr lang="en-US"/>
           </a:p>
@@ -2024,7 +2556,7 @@
     </p:spTree>
     <p:extLst>
       <p:ext uri="{BB962C8B-B14F-4D97-AF65-F5344CB8AC3E}">
-        <p14:creationId xmlns:p14="http://schemas.microsoft.com/office/powerpoint/2010/main" val="3110967491"/>
+        <p14:creationId xmlns:p14="http://schemas.microsoft.com/office/powerpoint/2010/main" val="661585251"/>
       </p:ext>
     </p:extLst>
   </p:cSld>
@@ -2223,7 +2755,7 @@
             <a:fld id="{B61BEF0D-F0BB-DE4B-95CE-6DB70DBA9567}" type="datetimeFigureOut">
               <a:rPr lang="en-US" dirty="0"/>
               <a:pPr/>
-              <a:t>4/6/2022</a:t>
+              <a:t>6/21/2022</a:t>
             </a:fld>
             <a:endParaRPr lang="en-US" dirty="0"/>
           </a:p>
@@ -2558,7 +3090,7 @@
             <a:fld id="{B61BEF0D-F0BB-DE4B-95CE-6DB70DBA9567}" type="datetimeFigureOut">
               <a:rPr lang="en-US" dirty="0"/>
               <a:pPr/>
-              <a:t>4/6/2022</a:t>
+              <a:t>6/21/2022</a:t>
             </a:fld>
             <a:endParaRPr lang="en-US" dirty="0"/>
           </a:p>
@@ -2956,7 +3488,7 @@
             <a:fld id="{B61BEF0D-F0BB-DE4B-95CE-6DB70DBA9567}" type="datetimeFigureOut">
               <a:rPr lang="en-US" dirty="0"/>
               <a:pPr/>
-              <a:t>4/6/2022</a:t>
+              <a:t>6/21/2022</a:t>
             </a:fld>
             <a:endParaRPr lang="en-US" dirty="0"/>
           </a:p>
@@ -3289,7 +3821,7 @@
             <a:fld id="{B61BEF0D-F0BB-DE4B-95CE-6DB70DBA9567}" type="datetimeFigureOut">
               <a:rPr lang="en-US" dirty="0"/>
               <a:pPr/>
-              <a:t>4/6/2022</a:t>
+              <a:t>6/21/2022</a:t>
             </a:fld>
             <a:endParaRPr lang="en-US" dirty="0"/>
           </a:p>
@@ -3606,7 +4138,7 @@
             <a:fld id="{B61BEF0D-F0BB-DE4B-95CE-6DB70DBA9567}" type="datetimeFigureOut">
               <a:rPr lang="en-US" dirty="0"/>
               <a:pPr/>
-              <a:t>4/6/2022</a:t>
+              <a:t>6/21/2022</a:t>
             </a:fld>
             <a:endParaRPr lang="en-US" dirty="0"/>
           </a:p>
@@ -3999,7 +4531,7 @@
             <a:fld id="{B61BEF0D-F0BB-DE4B-95CE-6DB70DBA9567}" type="datetimeFigureOut">
               <a:rPr lang="en-US" dirty="0"/>
               <a:pPr/>
-              <a:t>4/6/2022</a:t>
+              <a:t>6/21/2022</a:t>
             </a:fld>
             <a:endParaRPr lang="en-US" dirty="0"/>
           </a:p>
@@ -4253,7 +4785,7 @@
             <a:fld id="{B61BEF0D-F0BB-DE4B-95CE-6DB70DBA9567}" type="datetimeFigureOut">
               <a:rPr lang="en-US" dirty="0"/>
               <a:pPr/>
-              <a:t>4/6/2022</a:t>
+              <a:t>6/21/2022</a:t>
             </a:fld>
             <a:endParaRPr lang="en-US" dirty="0"/>
           </a:p>
@@ -4512,7 +5044,7 @@
             <a:fld id="{B61BEF0D-F0BB-DE4B-95CE-6DB70DBA9567}" type="datetimeFigureOut">
               <a:rPr lang="en-US" dirty="0"/>
               <a:pPr/>
-              <a:t>4/6/2022</a:t>
+              <a:t>6/21/2022</a:t>
             </a:fld>
             <a:endParaRPr lang="en-US" dirty="0"/>
           </a:p>
@@ -4771,7 +5303,7 @@
             <a:fld id="{B61BEF0D-F0BB-DE4B-95CE-6DB70DBA9567}" type="datetimeFigureOut">
               <a:rPr lang="en-US" dirty="0"/>
               <a:pPr/>
-              <a:t>4/6/2022</a:t>
+              <a:t>6/21/2022</a:t>
             </a:fld>
             <a:endParaRPr lang="en-US" dirty="0"/>
           </a:p>
@@ -5097,7 +5629,7 @@
             <a:fld id="{B61BEF0D-F0BB-DE4B-95CE-6DB70DBA9567}" type="datetimeFigureOut">
               <a:rPr lang="en-US" dirty="0"/>
               <a:pPr/>
-              <a:t>4/6/2022</a:t>
+              <a:t>6/21/2022</a:t>
             </a:fld>
             <a:endParaRPr lang="en-US" dirty="0"/>
           </a:p>
@@ -5417,7 +5949,7 @@
             <a:fld id="{B61BEF0D-F0BB-DE4B-95CE-6DB70DBA9567}" type="datetimeFigureOut">
               <a:rPr lang="en-US" dirty="0"/>
               <a:pPr/>
-              <a:t>4/6/2022</a:t>
+              <a:t>6/21/2022</a:t>
             </a:fld>
             <a:endParaRPr lang="en-US" dirty="0"/>
           </a:p>
@@ -5871,7 +6403,7 @@
             <a:fld id="{B61BEF0D-F0BB-DE4B-95CE-6DB70DBA9567}" type="datetimeFigureOut">
               <a:rPr lang="en-US" dirty="0"/>
               <a:pPr/>
-              <a:t>4/6/2022</a:t>
+              <a:t>6/21/2022</a:t>
             </a:fld>
             <a:endParaRPr lang="en-US" dirty="0"/>
           </a:p>
@@ -6073,7 +6605,7 @@
             <a:fld id="{B61BEF0D-F0BB-DE4B-95CE-6DB70DBA9567}" type="datetimeFigureOut">
               <a:rPr lang="en-US" dirty="0"/>
               <a:pPr/>
-              <a:t>4/6/2022</a:t>
+              <a:t>6/21/2022</a:t>
             </a:fld>
             <a:endParaRPr lang="en-US" dirty="0"/>
           </a:p>
@@ -6247,7 +6779,7 @@
             <a:fld id="{B61BEF0D-F0BB-DE4B-95CE-6DB70DBA9567}" type="datetimeFigureOut">
               <a:rPr lang="en-US" dirty="0"/>
               <a:pPr/>
-              <a:t>4/6/2022</a:t>
+              <a:t>6/21/2022</a:t>
             </a:fld>
             <a:endParaRPr lang="en-US" dirty="0"/>
           </a:p>
@@ -6577,7 +7109,7 @@
             <a:fld id="{B61BEF0D-F0BB-DE4B-95CE-6DB70DBA9567}" type="datetimeFigureOut">
               <a:rPr lang="en-US" dirty="0"/>
               <a:pPr/>
-              <a:t>4/6/2022</a:t>
+              <a:t>6/21/2022</a:t>
             </a:fld>
             <a:endParaRPr lang="en-US" dirty="0"/>
           </a:p>
@@ -6919,7 +7451,7 @@
             <a:fld id="{B61BEF0D-F0BB-DE4B-95CE-6DB70DBA9567}" type="datetimeFigureOut">
               <a:rPr lang="en-US" dirty="0"/>
               <a:pPr/>
-              <a:t>4/6/2022</a:t>
+              <a:t>6/21/2022</a:t>
             </a:fld>
             <a:endParaRPr lang="en-US" dirty="0"/>
           </a:p>
@@ -9033,7 +9565,7 @@
             <a:fld id="{B61BEF0D-F0BB-DE4B-95CE-6DB70DBA9567}" type="datetimeFigureOut">
               <a:rPr lang="en-US" dirty="0"/>
               <a:pPr/>
-              <a:t>4/6/2022</a:t>
+              <a:t>6/21/2022</a:t>
             </a:fld>
             <a:endParaRPr lang="en-US" dirty="0"/>
           </a:p>
@@ -9559,7 +10091,7 @@
         <p:spPr/>
         <p:txBody>
           <a:bodyPr>
-            <a:normAutofit/>
+            <a:normAutofit fontScale="90000"/>
           </a:bodyPr>
           <a:lstStyle/>
           <a:p>
@@ -9570,7 +10102,7 @@
                 </a:solidFill>
                 <a:latin typeface="Open Sans" panose="020B0606030504020204" pitchFamily="34" charset="0"/>
               </a:rPr>
-              <a:t>Introduction to IoT</a:t>
+              <a:t>Introduction to Development with Azure IoT</a:t>
             </a:r>
             <a:endParaRPr lang="en-US" dirty="0">
               <a:solidFill>
@@ -9616,6 +10148,89 @@
 </file>
 
 <file path=ppt/slides/slide10.xml><?xml version="1.0" encoding="utf-8"?>
+<p:sld xmlns:a="http://schemas.openxmlformats.org/drawingml/2006/main" xmlns:r="http://schemas.openxmlformats.org/officeDocument/2006/relationships" xmlns:p="http://schemas.openxmlformats.org/presentationml/2006/main">
+  <p:cSld>
+    <p:spTree>
+      <p:nvGrpSpPr>
+        <p:cNvPr id="1" name=""/>
+        <p:cNvGrpSpPr/>
+        <p:nvPr/>
+      </p:nvGrpSpPr>
+      <p:grpSpPr>
+        <a:xfrm>
+          <a:off x="0" y="0"/>
+          <a:ext cx="0" cy="0"/>
+          <a:chOff x="0" y="0"/>
+          <a:chExt cx="0" cy="0"/>
+        </a:xfrm>
+      </p:grpSpPr>
+      <p:sp>
+        <p:nvSpPr>
+          <p:cNvPr id="6" name="Title 5">
+            <a:extLst>
+              <a:ext uri="{FF2B5EF4-FFF2-40B4-BE49-F238E27FC236}">
+                <a16:creationId xmlns:a16="http://schemas.microsoft.com/office/drawing/2014/main" id="{ED6ABB4B-1B8A-455F-9E7E-7D86AAC143FA}"/>
+              </a:ext>
+            </a:extLst>
+          </p:cNvPr>
+          <p:cNvSpPr>
+            <a:spLocks noGrp="1"/>
+          </p:cNvSpPr>
+          <p:nvPr>
+            <p:ph type="title"/>
+          </p:nvPr>
+        </p:nvSpPr>
+        <p:spPr/>
+        <p:txBody>
+          <a:bodyPr/>
+          <a:lstStyle/>
+          <a:p>
+            <a:r>
+              <a:rPr lang="en-US" dirty="0"/>
+              <a:t>Device Provisioning Service (DPS)</a:t>
+            </a:r>
+          </a:p>
+        </p:txBody>
+      </p:sp>
+      <p:sp>
+        <p:nvSpPr>
+          <p:cNvPr id="7" name="Text Placeholder 6">
+            <a:extLst>
+              <a:ext uri="{FF2B5EF4-FFF2-40B4-BE49-F238E27FC236}">
+                <a16:creationId xmlns:a16="http://schemas.microsoft.com/office/drawing/2014/main" id="{CF846C4E-3E11-43D4-8C54-B8734AC80D5D}"/>
+              </a:ext>
+            </a:extLst>
+          </p:cNvPr>
+          <p:cNvSpPr>
+            <a:spLocks noGrp="1"/>
+          </p:cNvSpPr>
+          <p:nvPr>
+            <p:ph type="body" idx="1"/>
+          </p:nvPr>
+        </p:nvSpPr>
+        <p:spPr/>
+        <p:txBody>
+          <a:bodyPr/>
+          <a:lstStyle/>
+          <a:p>
+            <a:endParaRPr lang="en-US"/>
+          </a:p>
+        </p:txBody>
+      </p:sp>
+    </p:spTree>
+    <p:extLst>
+      <p:ext uri="{BB962C8B-B14F-4D97-AF65-F5344CB8AC3E}">
+        <p14:creationId xmlns:p14="http://schemas.microsoft.com/office/powerpoint/2010/main" val="3142814330"/>
+      </p:ext>
+    </p:extLst>
+  </p:cSld>
+  <p:clrMapOvr>
+    <a:masterClrMapping/>
+  </p:clrMapOvr>
+</p:sld>
+</file>
+
+<file path=ppt/slides/slide11.xml><?xml version="1.0" encoding="utf-8"?>
 <p:sld xmlns:a="http://schemas.openxmlformats.org/drawingml/2006/main" xmlns:r="http://schemas.openxmlformats.org/officeDocument/2006/relationships" xmlns:p="http://schemas.openxmlformats.org/presentationml/2006/main">
   <p:cSld>
     <p:spTree>
@@ -9789,7 +10404,7 @@
 </p:sld>
 </file>
 
-<file path=ppt/slides/slide11.xml><?xml version="1.0" encoding="utf-8"?>
+<file path=ppt/slides/slide12.xml><?xml version="1.0" encoding="utf-8"?>
 <p:sld xmlns:a="http://schemas.openxmlformats.org/drawingml/2006/main" xmlns:r="http://schemas.openxmlformats.org/officeDocument/2006/relationships" xmlns:p="http://schemas.openxmlformats.org/presentationml/2006/main">
   <p:cSld>
     <p:bg>
@@ -14669,7 +15284,7 @@
 </p:sld>
 </file>
 
-<file path=ppt/slides/slide12.xml><?xml version="1.0" encoding="utf-8"?>
+<file path=ppt/slides/slide13.xml><?xml version="1.0" encoding="utf-8"?>
 <p:sld xmlns:a="http://schemas.openxmlformats.org/drawingml/2006/main" xmlns:r="http://schemas.openxmlformats.org/officeDocument/2006/relationships" xmlns:p="http://schemas.openxmlformats.org/presentationml/2006/main">
   <p:cSld>
     <p:spTree>
@@ -14752,7 +15367,7 @@
 </p:sld>
 </file>
 
-<file path=ppt/slides/slide13.xml><?xml version="1.0" encoding="utf-8"?>
+<file path=ppt/slides/slide14.xml><?xml version="1.0" encoding="utf-8"?>
 <p:sld xmlns:a="http://schemas.openxmlformats.org/drawingml/2006/main" xmlns:r="http://schemas.openxmlformats.org/officeDocument/2006/relationships" xmlns:p="http://schemas.openxmlformats.org/presentationml/2006/main">
   <p:cSld>
     <p:spTree>
@@ -14915,7 +15530,7 @@
 </p:sld>
 </file>
 
-<file path=ppt/slides/slide14.xml><?xml version="1.0" encoding="utf-8"?>
+<file path=ppt/slides/slide15.xml><?xml version="1.0" encoding="utf-8"?>
 <p:sld xmlns:a="http://schemas.openxmlformats.org/drawingml/2006/main" xmlns:r="http://schemas.openxmlformats.org/officeDocument/2006/relationships" xmlns:p="http://schemas.openxmlformats.org/presentationml/2006/main">
   <p:cSld>
     <p:spTree>
@@ -15083,7 +15698,7 @@
 </p:sld>
 </file>
 
-<file path=ppt/slides/slide15.xml><?xml version="1.0" encoding="utf-8"?>
+<file path=ppt/slides/slide16.xml><?xml version="1.0" encoding="utf-8"?>
 <p:sld xmlns:a="http://schemas.openxmlformats.org/drawingml/2006/main" xmlns:r="http://schemas.openxmlformats.org/officeDocument/2006/relationships" xmlns:p="http://schemas.openxmlformats.org/presentationml/2006/main">
   <p:cSld>
     <p:spTree>
@@ -15166,7 +15781,7 @@
 </p:sld>
 </file>
 
-<file path=ppt/slides/slide16.xml><?xml version="1.0" encoding="utf-8"?>
+<file path=ppt/slides/slide17.xml><?xml version="1.0" encoding="utf-8"?>
 <p:sld xmlns:a="http://schemas.openxmlformats.org/drawingml/2006/main" xmlns:r="http://schemas.openxmlformats.org/officeDocument/2006/relationships" xmlns:p="http://schemas.openxmlformats.org/presentationml/2006/main">
   <p:cSld>
     <p:spTree>
@@ -15227,7 +15842,12 @@
             <p:ph idx="1"/>
           </p:nvPr>
         </p:nvSpPr>
-        <p:spPr/>
+        <p:spPr>
+          <a:xfrm>
+            <a:off x="2589212" y="2133600"/>
+            <a:ext cx="8915400" cy="3777622"/>
+          </a:xfrm>
+        </p:spPr>
         <p:txBody>
           <a:bodyPr/>
           <a:lstStyle/>
@@ -15285,7 +15905,7 @@
         </p:nvSpPr>
         <p:spPr>
           <a:xfrm>
-            <a:off x="3048000" y="5449557"/>
+            <a:off x="2589212" y="1487269"/>
             <a:ext cx="8248650" cy="646331"/>
           </a:xfrm>
           <a:prstGeom prst="rect">
@@ -15306,6 +15926,36 @@
           </a:p>
         </p:txBody>
       </p:sp>
+      <p:pic>
+        <p:nvPicPr>
+          <p:cNvPr id="3" name="Picture 2">
+            <a:extLst>
+              <a:ext uri="{FF2B5EF4-FFF2-40B4-BE49-F238E27FC236}">
+                <a16:creationId xmlns:a16="http://schemas.microsoft.com/office/drawing/2014/main" id="{855DCE96-E912-10BA-B3DE-44FD41DE96BD}"/>
+              </a:ext>
+            </a:extLst>
+          </p:cNvPr>
+          <p:cNvPicPr>
+            <a:picLocks noChangeAspect="1"/>
+          </p:cNvPicPr>
+          <p:nvPr/>
+        </p:nvPicPr>
+        <p:blipFill>
+          <a:blip r:embed="rId2"/>
+          <a:stretch>
+            <a:fillRect/>
+          </a:stretch>
+        </p:blipFill>
+        <p:spPr>
+          <a:xfrm>
+            <a:off x="6096000" y="3387539"/>
+            <a:ext cx="5746363" cy="3130923"/>
+          </a:xfrm>
+          <a:prstGeom prst="rect">
+            <a:avLst/>
+          </a:prstGeom>
+        </p:spPr>
+      </p:pic>
     </p:spTree>
     <p:extLst>
       <p:ext uri="{BB962C8B-B14F-4D97-AF65-F5344CB8AC3E}">
@@ -15319,7 +15969,7 @@
 </p:sld>
 </file>
 
-<file path=ppt/slides/slide17.xml><?xml version="1.0" encoding="utf-8"?>
+<file path=ppt/slides/slide18.xml><?xml version="1.0" encoding="utf-8"?>
 <p:sld xmlns:a="http://schemas.openxmlformats.org/drawingml/2006/main" xmlns:r="http://schemas.openxmlformats.org/officeDocument/2006/relationships" xmlns:p="http://schemas.openxmlformats.org/presentationml/2006/main">
   <p:cSld>
     <p:bg>
@@ -15566,7 +16216,7 @@
 </p:sld>
 </file>
 
-<file path=ppt/slides/slide18.xml><?xml version="1.0" encoding="utf-8"?>
+<file path=ppt/slides/slide19.xml><?xml version="1.0" encoding="utf-8"?>
 <p:sld xmlns:a="http://schemas.openxmlformats.org/drawingml/2006/main" xmlns:r="http://schemas.openxmlformats.org/officeDocument/2006/relationships" xmlns:p="http://schemas.openxmlformats.org/presentationml/2006/main">
   <p:cSld>
     <p:spTree>
@@ -15640,181 +16290,6 @@
     <p:extLst>
       <p:ext uri="{BB962C8B-B14F-4D97-AF65-F5344CB8AC3E}">
         <p14:creationId xmlns:p14="http://schemas.microsoft.com/office/powerpoint/2010/main" val="3328732430"/>
-      </p:ext>
-    </p:extLst>
-  </p:cSld>
-  <p:clrMapOvr>
-    <a:masterClrMapping/>
-  </p:clrMapOvr>
-</p:sld>
-</file>
-
-<file path=ppt/slides/slide19.xml><?xml version="1.0" encoding="utf-8"?>
-<p:sld xmlns:a="http://schemas.openxmlformats.org/drawingml/2006/main" xmlns:r="http://schemas.openxmlformats.org/officeDocument/2006/relationships" xmlns:p="http://schemas.openxmlformats.org/presentationml/2006/main">
-  <p:cSld>
-    <p:spTree>
-      <p:nvGrpSpPr>
-        <p:cNvPr id="1" name=""/>
-        <p:cNvGrpSpPr/>
-        <p:nvPr/>
-      </p:nvGrpSpPr>
-      <p:grpSpPr>
-        <a:xfrm>
-          <a:off x="0" y="0"/>
-          <a:ext cx="0" cy="0"/>
-          <a:chOff x="0" y="0"/>
-          <a:chExt cx="0" cy="0"/>
-        </a:xfrm>
-      </p:grpSpPr>
-      <p:sp>
-        <p:nvSpPr>
-          <p:cNvPr id="4" name="Title 3">
-            <a:extLst>
-              <a:ext uri="{FF2B5EF4-FFF2-40B4-BE49-F238E27FC236}">
-                <a16:creationId xmlns:a16="http://schemas.microsoft.com/office/drawing/2014/main" id="{179A6E39-5631-46FB-A960-2797D1888C71}"/>
-              </a:ext>
-            </a:extLst>
-          </p:cNvPr>
-          <p:cNvSpPr>
-            <a:spLocks noGrp="1"/>
-          </p:cNvSpPr>
-          <p:nvPr>
-            <p:ph type="title"/>
-          </p:nvPr>
-        </p:nvSpPr>
-        <p:spPr/>
-        <p:txBody>
-          <a:bodyPr/>
-          <a:lstStyle/>
-          <a:p>
-            <a:r>
-              <a:rPr lang="en-US" dirty="0"/>
-              <a:t>IoT Central</a:t>
-            </a:r>
-          </a:p>
-        </p:txBody>
-      </p:sp>
-      <p:sp>
-        <p:nvSpPr>
-          <p:cNvPr id="5" name="Content Placeholder 4">
-            <a:extLst>
-              <a:ext uri="{FF2B5EF4-FFF2-40B4-BE49-F238E27FC236}">
-                <a16:creationId xmlns:a16="http://schemas.microsoft.com/office/drawing/2014/main" id="{A48F9EBC-ABEB-4A50-BDCE-8132DA7759E0}"/>
-              </a:ext>
-            </a:extLst>
-          </p:cNvPr>
-          <p:cNvSpPr>
-            <a:spLocks noGrp="1"/>
-          </p:cNvSpPr>
-          <p:nvPr>
-            <p:ph idx="1"/>
-          </p:nvPr>
-        </p:nvSpPr>
-        <p:spPr/>
-        <p:txBody>
-          <a:bodyPr/>
-          <a:lstStyle/>
-          <a:p>
-            <a:r>
-              <a:rPr lang="en-US" dirty="0"/>
-              <a:t>Plug and Play solutions</a:t>
-            </a:r>
-          </a:p>
-          <a:p>
-            <a:r>
-              <a:rPr lang="en-US" dirty="0"/>
-              <a:t>Low Code but high functionality</a:t>
-            </a:r>
-          </a:p>
-          <a:p>
-            <a:r>
-              <a:rPr lang="en-US" dirty="0"/>
-              <a:t>Dashboards</a:t>
-            </a:r>
-          </a:p>
-          <a:p>
-            <a:r>
-              <a:rPr lang="en-US" dirty="0"/>
-              <a:t>Commands</a:t>
-            </a:r>
-          </a:p>
-          <a:p>
-            <a:r>
-              <a:rPr lang="en-US" dirty="0"/>
-              <a:t>Sample apps</a:t>
-            </a:r>
-          </a:p>
-        </p:txBody>
-      </p:sp>
-      <p:pic>
-        <p:nvPicPr>
-          <p:cNvPr id="7" name="Picture 6">
-            <a:extLst>
-              <a:ext uri="{FF2B5EF4-FFF2-40B4-BE49-F238E27FC236}">
-                <a16:creationId xmlns:a16="http://schemas.microsoft.com/office/drawing/2014/main" id="{C505DF58-A436-47CA-8657-EB16CD3E19A6}"/>
-              </a:ext>
-            </a:extLst>
-          </p:cNvPr>
-          <p:cNvPicPr>
-            <a:picLocks noChangeAspect="1"/>
-          </p:cNvPicPr>
-          <p:nvPr/>
-        </p:nvPicPr>
-        <p:blipFill>
-          <a:blip r:embed="rId3"/>
-          <a:stretch>
-            <a:fillRect/>
-          </a:stretch>
-        </p:blipFill>
-        <p:spPr>
-          <a:xfrm>
-            <a:off x="5479640" y="3314700"/>
-            <a:ext cx="6159243" cy="3409581"/>
-          </a:xfrm>
-          <a:prstGeom prst="rect">
-            <a:avLst/>
-          </a:prstGeom>
-        </p:spPr>
-      </p:pic>
-      <p:sp>
-        <p:nvSpPr>
-          <p:cNvPr id="9" name="TextBox 8">
-            <a:extLst>
-              <a:ext uri="{FF2B5EF4-FFF2-40B4-BE49-F238E27FC236}">
-                <a16:creationId xmlns:a16="http://schemas.microsoft.com/office/drawing/2014/main" id="{1FC88C1A-4AAC-414D-823F-9923C28069BF}"/>
-              </a:ext>
-            </a:extLst>
-          </p:cNvPr>
-          <p:cNvSpPr txBox="1"/>
-          <p:nvPr/>
-        </p:nvSpPr>
-        <p:spPr>
-          <a:xfrm>
-            <a:off x="2431640" y="6157690"/>
-            <a:ext cx="6096000" cy="369332"/>
-          </a:xfrm>
-          <a:prstGeom prst="rect">
-            <a:avLst/>
-          </a:prstGeom>
-          <a:noFill/>
-        </p:spPr>
-        <p:txBody>
-          <a:bodyPr wrap="square">
-            <a:spAutoFit/>
-          </a:bodyPr>
-          <a:lstStyle/>
-          <a:p>
-            <a:r>
-              <a:rPr lang="en-US" dirty="0"/>
-              <a:t>https://apps.azureiotcentral.com/</a:t>
-            </a:r>
-          </a:p>
-        </p:txBody>
-      </p:sp>
-    </p:spTree>
-    <p:extLst>
-      <p:ext uri="{BB962C8B-B14F-4D97-AF65-F5344CB8AC3E}">
-        <p14:creationId xmlns:p14="http://schemas.microsoft.com/office/powerpoint/2010/main" val="4080909617"/>
       </p:ext>
     </p:extLst>
   </p:cSld>
@@ -19553,6 +20028,729 @@
       </p:grpSpPr>
       <p:sp>
         <p:nvSpPr>
+          <p:cNvPr id="4" name="Title 3">
+            <a:extLst>
+              <a:ext uri="{FF2B5EF4-FFF2-40B4-BE49-F238E27FC236}">
+                <a16:creationId xmlns:a16="http://schemas.microsoft.com/office/drawing/2014/main" id="{179A6E39-5631-46FB-A960-2797D1888C71}"/>
+              </a:ext>
+            </a:extLst>
+          </p:cNvPr>
+          <p:cNvSpPr>
+            <a:spLocks noGrp="1"/>
+          </p:cNvSpPr>
+          <p:nvPr>
+            <p:ph type="title"/>
+          </p:nvPr>
+        </p:nvSpPr>
+        <p:spPr/>
+        <p:txBody>
+          <a:bodyPr/>
+          <a:lstStyle/>
+          <a:p>
+            <a:r>
+              <a:rPr lang="en-US" dirty="0"/>
+              <a:t>IoT Central</a:t>
+            </a:r>
+          </a:p>
+        </p:txBody>
+      </p:sp>
+      <p:sp>
+        <p:nvSpPr>
+          <p:cNvPr id="5" name="Content Placeholder 4">
+            <a:extLst>
+              <a:ext uri="{FF2B5EF4-FFF2-40B4-BE49-F238E27FC236}">
+                <a16:creationId xmlns:a16="http://schemas.microsoft.com/office/drawing/2014/main" id="{A48F9EBC-ABEB-4A50-BDCE-8132DA7759E0}"/>
+              </a:ext>
+            </a:extLst>
+          </p:cNvPr>
+          <p:cNvSpPr>
+            <a:spLocks noGrp="1"/>
+          </p:cNvSpPr>
+          <p:nvPr>
+            <p:ph idx="1"/>
+          </p:nvPr>
+        </p:nvSpPr>
+        <p:spPr>
+          <a:xfrm>
+            <a:off x="2592925" y="1675218"/>
+            <a:ext cx="8915400" cy="3777622"/>
+          </a:xfrm>
+        </p:spPr>
+        <p:txBody>
+          <a:bodyPr/>
+          <a:lstStyle/>
+          <a:p>
+            <a:r>
+              <a:rPr lang="en-US" dirty="0"/>
+              <a:t>Plug and Play solutions</a:t>
+            </a:r>
+          </a:p>
+          <a:p>
+            <a:r>
+              <a:rPr lang="en-US" dirty="0"/>
+              <a:t>Low Code but high functionality</a:t>
+            </a:r>
+          </a:p>
+          <a:p>
+            <a:r>
+              <a:rPr lang="en-US" dirty="0"/>
+              <a:t>Dashboards</a:t>
+            </a:r>
+          </a:p>
+          <a:p>
+            <a:r>
+              <a:rPr lang="en-US" dirty="0"/>
+              <a:t>Commands</a:t>
+            </a:r>
+          </a:p>
+          <a:p>
+            <a:r>
+              <a:rPr lang="en-US" dirty="0"/>
+              <a:t>Sample apps</a:t>
+            </a:r>
+          </a:p>
+        </p:txBody>
+      </p:sp>
+      <p:pic>
+        <p:nvPicPr>
+          <p:cNvPr id="7" name="Picture 6">
+            <a:extLst>
+              <a:ext uri="{FF2B5EF4-FFF2-40B4-BE49-F238E27FC236}">
+                <a16:creationId xmlns:a16="http://schemas.microsoft.com/office/drawing/2014/main" id="{C505DF58-A436-47CA-8657-EB16CD3E19A6}"/>
+              </a:ext>
+            </a:extLst>
+          </p:cNvPr>
+          <p:cNvPicPr>
+            <a:picLocks noChangeAspect="1"/>
+          </p:cNvPicPr>
+          <p:nvPr/>
+        </p:nvPicPr>
+        <p:blipFill>
+          <a:blip r:embed="rId3"/>
+          <a:stretch>
+            <a:fillRect/>
+          </a:stretch>
+        </p:blipFill>
+        <p:spPr>
+          <a:xfrm>
+            <a:off x="5479640" y="2609850"/>
+            <a:ext cx="6159243" cy="3409581"/>
+          </a:xfrm>
+          <a:prstGeom prst="rect">
+            <a:avLst/>
+          </a:prstGeom>
+        </p:spPr>
+      </p:pic>
+      <p:sp>
+        <p:nvSpPr>
+          <p:cNvPr id="9" name="TextBox 8">
+            <a:extLst>
+              <a:ext uri="{FF2B5EF4-FFF2-40B4-BE49-F238E27FC236}">
+                <a16:creationId xmlns:a16="http://schemas.microsoft.com/office/drawing/2014/main" id="{1FC88C1A-4AAC-414D-823F-9923C28069BF}"/>
+              </a:ext>
+            </a:extLst>
+          </p:cNvPr>
+          <p:cNvSpPr txBox="1"/>
+          <p:nvPr/>
+        </p:nvSpPr>
+        <p:spPr>
+          <a:xfrm>
+            <a:off x="2431640" y="6157690"/>
+            <a:ext cx="6096000" cy="369332"/>
+          </a:xfrm>
+          <a:prstGeom prst="rect">
+            <a:avLst/>
+          </a:prstGeom>
+          <a:noFill/>
+        </p:spPr>
+        <p:txBody>
+          <a:bodyPr wrap="square">
+            <a:spAutoFit/>
+          </a:bodyPr>
+          <a:lstStyle/>
+          <a:p>
+            <a:r>
+              <a:rPr lang="en-US" dirty="0"/>
+              <a:t>https://apps.azureiotcentral.com/</a:t>
+            </a:r>
+          </a:p>
+        </p:txBody>
+      </p:sp>
+    </p:spTree>
+    <p:extLst>
+      <p:ext uri="{BB962C8B-B14F-4D97-AF65-F5344CB8AC3E}">
+        <p14:creationId xmlns:p14="http://schemas.microsoft.com/office/powerpoint/2010/main" val="4080909617"/>
+      </p:ext>
+    </p:extLst>
+  </p:cSld>
+  <p:clrMapOvr>
+    <a:masterClrMapping/>
+  </p:clrMapOvr>
+</p:sld>
+</file>
+
+<file path=ppt/slides/slide21.xml><?xml version="1.0" encoding="utf-8"?>
+<p:sld xmlns:a="http://schemas.openxmlformats.org/drawingml/2006/main" xmlns:r="http://schemas.openxmlformats.org/officeDocument/2006/relationships" xmlns:p="http://schemas.openxmlformats.org/presentationml/2006/main">
+  <p:cSld>
+    <p:spTree>
+      <p:nvGrpSpPr>
+        <p:cNvPr id="1" name=""/>
+        <p:cNvGrpSpPr/>
+        <p:nvPr/>
+      </p:nvGrpSpPr>
+      <p:grpSpPr>
+        <a:xfrm>
+          <a:off x="0" y="0"/>
+          <a:ext cx="0" cy="0"/>
+          <a:chOff x="0" y="0"/>
+          <a:chExt cx="0" cy="0"/>
+        </a:xfrm>
+      </p:grpSpPr>
+      <p:sp>
+        <p:nvSpPr>
+          <p:cNvPr id="6" name="Title 5">
+            <a:extLst>
+              <a:ext uri="{FF2B5EF4-FFF2-40B4-BE49-F238E27FC236}">
+                <a16:creationId xmlns:a16="http://schemas.microsoft.com/office/drawing/2014/main" id="{ED6ABB4B-1B8A-455F-9E7E-7D86AAC143FA}"/>
+              </a:ext>
+            </a:extLst>
+          </p:cNvPr>
+          <p:cNvSpPr>
+            <a:spLocks noGrp="1"/>
+          </p:cNvSpPr>
+          <p:nvPr>
+            <p:ph type="title"/>
+          </p:nvPr>
+        </p:nvSpPr>
+        <p:spPr/>
+        <p:txBody>
+          <a:bodyPr/>
+          <a:lstStyle/>
+          <a:p>
+            <a:r>
+              <a:rPr lang="en-US" dirty="0"/>
+              <a:t>Stream Live Telemetry to Azure</a:t>
+            </a:r>
+          </a:p>
+        </p:txBody>
+      </p:sp>
+      <p:sp>
+        <p:nvSpPr>
+          <p:cNvPr id="7" name="Text Placeholder 6">
+            <a:extLst>
+              <a:ext uri="{FF2B5EF4-FFF2-40B4-BE49-F238E27FC236}">
+                <a16:creationId xmlns:a16="http://schemas.microsoft.com/office/drawing/2014/main" id="{CF846C4E-3E11-43D4-8C54-B8734AC80D5D}"/>
+              </a:ext>
+            </a:extLst>
+          </p:cNvPr>
+          <p:cNvSpPr>
+            <a:spLocks noGrp="1"/>
+          </p:cNvSpPr>
+          <p:nvPr>
+            <p:ph type="body" idx="1"/>
+          </p:nvPr>
+        </p:nvSpPr>
+        <p:spPr/>
+        <p:txBody>
+          <a:bodyPr/>
+          <a:lstStyle/>
+          <a:p>
+            <a:r>
+              <a:rPr lang="en-US" dirty="0"/>
+              <a:t>Raspberry Pi with </a:t>
+            </a:r>
+            <a:r>
+              <a:rPr lang="en-US" dirty="0" err="1"/>
+              <a:t>Pimoroni</a:t>
+            </a:r>
+            <a:r>
+              <a:rPr lang="en-US" dirty="0"/>
+              <a:t> Enviro and some simple C#/Python</a:t>
+            </a:r>
+          </a:p>
+        </p:txBody>
+      </p:sp>
+    </p:spTree>
+    <p:extLst>
+      <p:ext uri="{BB962C8B-B14F-4D97-AF65-F5344CB8AC3E}">
+        <p14:creationId xmlns:p14="http://schemas.microsoft.com/office/powerpoint/2010/main" val="3251829660"/>
+      </p:ext>
+    </p:extLst>
+  </p:cSld>
+  <p:clrMapOvr>
+    <a:masterClrMapping/>
+  </p:clrMapOvr>
+</p:sld>
+</file>
+
+<file path=ppt/slides/slide22.xml><?xml version="1.0" encoding="utf-8"?>
+<p:sld xmlns:a="http://schemas.openxmlformats.org/drawingml/2006/main" xmlns:r="http://schemas.openxmlformats.org/officeDocument/2006/relationships" xmlns:p="http://schemas.openxmlformats.org/presentationml/2006/main">
+  <p:cSld>
+    <p:spTree>
+      <p:nvGrpSpPr>
+        <p:cNvPr id="1" name=""/>
+        <p:cNvGrpSpPr/>
+        <p:nvPr/>
+      </p:nvGrpSpPr>
+      <p:grpSpPr>
+        <a:xfrm>
+          <a:off x="0" y="0"/>
+          <a:ext cx="0" cy="0"/>
+          <a:chOff x="0" y="0"/>
+          <a:chExt cx="0" cy="0"/>
+        </a:xfrm>
+      </p:grpSpPr>
+      <p:pic>
+        <p:nvPicPr>
+          <p:cNvPr id="11" name="Picture 10">
+            <a:extLst>
+              <a:ext uri="{FF2B5EF4-FFF2-40B4-BE49-F238E27FC236}">
+                <a16:creationId xmlns:a16="http://schemas.microsoft.com/office/drawing/2014/main" id="{B3D59D99-92E2-26E3-A78C-E03E8DAAA4E7}"/>
+              </a:ext>
+            </a:extLst>
+          </p:cNvPr>
+          <p:cNvPicPr>
+            <a:picLocks noChangeAspect="1"/>
+          </p:cNvPicPr>
+          <p:nvPr/>
+        </p:nvPicPr>
+        <p:blipFill>
+          <a:blip r:embed="rId3"/>
+          <a:stretch>
+            <a:fillRect/>
+          </a:stretch>
+        </p:blipFill>
+        <p:spPr>
+          <a:xfrm>
+            <a:off x="8809344" y="240631"/>
+            <a:ext cx="3382656" cy="2623077"/>
+          </a:xfrm>
+          <a:prstGeom prst="rect">
+            <a:avLst/>
+          </a:prstGeom>
+        </p:spPr>
+      </p:pic>
+      <p:sp>
+        <p:nvSpPr>
+          <p:cNvPr id="4" name="Title 3">
+            <a:extLst>
+              <a:ext uri="{FF2B5EF4-FFF2-40B4-BE49-F238E27FC236}">
+                <a16:creationId xmlns:a16="http://schemas.microsoft.com/office/drawing/2014/main" id="{5CA8DC3E-BD35-ED61-5215-90A8EF0F86A6}"/>
+              </a:ext>
+            </a:extLst>
+          </p:cNvPr>
+          <p:cNvSpPr>
+            <a:spLocks noGrp="1"/>
+          </p:cNvSpPr>
+          <p:nvPr>
+            <p:ph type="title"/>
+          </p:nvPr>
+        </p:nvSpPr>
+        <p:spPr/>
+        <p:txBody>
+          <a:bodyPr/>
+          <a:lstStyle/>
+          <a:p>
+            <a:r>
+              <a:rPr lang="en-US" dirty="0"/>
+              <a:t>Parts List</a:t>
+            </a:r>
+          </a:p>
+        </p:txBody>
+      </p:sp>
+      <p:sp>
+        <p:nvSpPr>
+          <p:cNvPr id="5" name="Content Placeholder 4">
+            <a:extLst>
+              <a:ext uri="{FF2B5EF4-FFF2-40B4-BE49-F238E27FC236}">
+                <a16:creationId xmlns:a16="http://schemas.microsoft.com/office/drawing/2014/main" id="{F6EA9DAB-3679-F398-3488-C857A06BC31C}"/>
+              </a:ext>
+            </a:extLst>
+          </p:cNvPr>
+          <p:cNvSpPr>
+            <a:spLocks noGrp="1"/>
+          </p:cNvSpPr>
+          <p:nvPr>
+            <p:ph idx="1"/>
+          </p:nvPr>
+        </p:nvSpPr>
+        <p:spPr/>
+        <p:txBody>
+          <a:bodyPr/>
+          <a:lstStyle/>
+          <a:p>
+            <a:r>
+              <a:rPr lang="en-US" dirty="0"/>
+              <a:t>Raspberry Pi (3+)</a:t>
+            </a:r>
+          </a:p>
+          <a:p>
+            <a:r>
+              <a:rPr lang="en-US" dirty="0" err="1"/>
+              <a:t>Pimoroni</a:t>
+            </a:r>
+            <a:r>
+              <a:rPr lang="en-US" dirty="0"/>
+              <a:t> Enviro (recommend </a:t>
+            </a:r>
+            <a:r>
+              <a:rPr lang="en-US" dirty="0" err="1"/>
+              <a:t>EnviroPlus</a:t>
+            </a:r>
+            <a:r>
+              <a:rPr lang="en-US" dirty="0"/>
+              <a:t> + PMS5003 sensor)</a:t>
+            </a:r>
+          </a:p>
+          <a:p>
+            <a:r>
+              <a:rPr lang="en-US" dirty="0" err="1"/>
+              <a:t>UCTronics</a:t>
+            </a:r>
+            <a:r>
+              <a:rPr lang="en-US" dirty="0"/>
+              <a:t> Male to Female GPIO Ribbon Cable 40pin Breadboard jumper</a:t>
+            </a:r>
+          </a:p>
+          <a:p>
+            <a:r>
+              <a:rPr lang="en-US" dirty="0" err="1"/>
+              <a:t>Pimoroni</a:t>
+            </a:r>
+            <a:r>
+              <a:rPr lang="en-US" dirty="0"/>
+              <a:t> Getting started (includes link to GitHub repo): https://learn.pimoroni.com/article/getting-started-with-enviro-plus</a:t>
+            </a:r>
+          </a:p>
+          <a:p>
+            <a:endParaRPr lang="en-US" dirty="0"/>
+          </a:p>
+        </p:txBody>
+      </p:sp>
+      <p:pic>
+        <p:nvPicPr>
+          <p:cNvPr id="7" name="Picture 6">
+            <a:extLst>
+              <a:ext uri="{FF2B5EF4-FFF2-40B4-BE49-F238E27FC236}">
+                <a16:creationId xmlns:a16="http://schemas.microsoft.com/office/drawing/2014/main" id="{33D39A01-3081-81A3-771E-742557E064A6}"/>
+              </a:ext>
+            </a:extLst>
+          </p:cNvPr>
+          <p:cNvPicPr>
+            <a:picLocks noChangeAspect="1"/>
+          </p:cNvPicPr>
+          <p:nvPr/>
+        </p:nvPicPr>
+        <p:blipFill>
+          <a:blip r:embed="rId4"/>
+          <a:stretch>
+            <a:fillRect/>
+          </a:stretch>
+        </p:blipFill>
+        <p:spPr>
+          <a:xfrm>
+            <a:off x="7230210" y="4105095"/>
+            <a:ext cx="3158267" cy="2301373"/>
+          </a:xfrm>
+          <a:prstGeom prst="rect">
+            <a:avLst/>
+          </a:prstGeom>
+        </p:spPr>
+      </p:pic>
+      <p:pic>
+        <p:nvPicPr>
+          <p:cNvPr id="9" name="Picture 8">
+            <a:extLst>
+              <a:ext uri="{FF2B5EF4-FFF2-40B4-BE49-F238E27FC236}">
+                <a16:creationId xmlns:a16="http://schemas.microsoft.com/office/drawing/2014/main" id="{79CC223E-48EF-8D49-356F-EDC39888D42B}"/>
+              </a:ext>
+            </a:extLst>
+          </p:cNvPr>
+          <p:cNvPicPr>
+            <a:picLocks noChangeAspect="1"/>
+          </p:cNvPicPr>
+          <p:nvPr/>
+        </p:nvPicPr>
+        <p:blipFill>
+          <a:blip r:embed="rId5"/>
+          <a:stretch>
+            <a:fillRect/>
+          </a:stretch>
+        </p:blipFill>
+        <p:spPr>
+          <a:xfrm>
+            <a:off x="2527108" y="4265018"/>
+            <a:ext cx="3781808" cy="2113902"/>
+          </a:xfrm>
+          <a:prstGeom prst="rect">
+            <a:avLst/>
+          </a:prstGeom>
+        </p:spPr>
+      </p:pic>
+    </p:spTree>
+    <p:extLst>
+      <p:ext uri="{BB962C8B-B14F-4D97-AF65-F5344CB8AC3E}">
+        <p14:creationId xmlns:p14="http://schemas.microsoft.com/office/powerpoint/2010/main" val="349966861"/>
+      </p:ext>
+    </p:extLst>
+  </p:cSld>
+  <p:clrMapOvr>
+    <a:masterClrMapping/>
+  </p:clrMapOvr>
+</p:sld>
+</file>
+
+<file path=ppt/slides/slide23.xml><?xml version="1.0" encoding="utf-8"?>
+<p:sld xmlns:a="http://schemas.openxmlformats.org/drawingml/2006/main" xmlns:r="http://schemas.openxmlformats.org/officeDocument/2006/relationships" xmlns:p="http://schemas.openxmlformats.org/presentationml/2006/main">
+  <p:cSld>
+    <p:spTree>
+      <p:nvGrpSpPr>
+        <p:cNvPr id="1" name=""/>
+        <p:cNvGrpSpPr/>
+        <p:nvPr/>
+      </p:nvGrpSpPr>
+      <p:grpSpPr>
+        <a:xfrm>
+          <a:off x="0" y="0"/>
+          <a:ext cx="0" cy="0"/>
+          <a:chOff x="0" y="0"/>
+          <a:chExt cx="0" cy="0"/>
+        </a:xfrm>
+      </p:grpSpPr>
+      <p:sp>
+        <p:nvSpPr>
+          <p:cNvPr id="4" name="Title 3">
+            <a:extLst>
+              <a:ext uri="{FF2B5EF4-FFF2-40B4-BE49-F238E27FC236}">
+                <a16:creationId xmlns:a16="http://schemas.microsoft.com/office/drawing/2014/main" id="{D8F67064-0391-9D61-5B12-56F717EC44BE}"/>
+              </a:ext>
+            </a:extLst>
+          </p:cNvPr>
+          <p:cNvSpPr>
+            <a:spLocks noGrp="1"/>
+          </p:cNvSpPr>
+          <p:nvPr>
+            <p:ph type="title"/>
+          </p:nvPr>
+        </p:nvSpPr>
+        <p:spPr/>
+        <p:txBody>
+          <a:bodyPr/>
+          <a:lstStyle/>
+          <a:p>
+            <a:r>
+              <a:rPr lang="en-US" dirty="0"/>
+              <a:t>SSH from Visual Studio Code</a:t>
+            </a:r>
+          </a:p>
+        </p:txBody>
+      </p:sp>
+      <p:sp>
+        <p:nvSpPr>
+          <p:cNvPr id="5" name="Content Placeholder 4">
+            <a:extLst>
+              <a:ext uri="{FF2B5EF4-FFF2-40B4-BE49-F238E27FC236}">
+                <a16:creationId xmlns:a16="http://schemas.microsoft.com/office/drawing/2014/main" id="{534C459B-E8E5-2866-9DA9-A4E02B370DA9}"/>
+              </a:ext>
+            </a:extLst>
+          </p:cNvPr>
+          <p:cNvSpPr>
+            <a:spLocks noGrp="1"/>
+          </p:cNvSpPr>
+          <p:nvPr>
+            <p:ph idx="1"/>
+          </p:nvPr>
+        </p:nvSpPr>
+        <p:spPr/>
+        <p:txBody>
+          <a:bodyPr/>
+          <a:lstStyle/>
+          <a:p>
+            <a:r>
+              <a:rPr lang="en-US" dirty="0"/>
+              <a:t>Using SSH from Visual Studio Code </a:t>
+            </a:r>
+          </a:p>
+          <a:p>
+            <a:pPr lvl="1"/>
+            <a:r>
+              <a:rPr lang="en-US" dirty="0">
+                <a:hlinkClick r:id="rId3"/>
+              </a:rPr>
+              <a:t>https://code.visualstudio.com/docs/remote/ssh</a:t>
+            </a:r>
+            <a:endParaRPr lang="en-US" dirty="0"/>
+          </a:p>
+          <a:p>
+            <a:pPr marL="0" indent="0">
+              <a:buNone/>
+            </a:pPr>
+            <a:endParaRPr lang="en-US" dirty="0"/>
+          </a:p>
+        </p:txBody>
+      </p:sp>
+      <p:pic>
+        <p:nvPicPr>
+          <p:cNvPr id="7" name="Picture 6">
+            <a:extLst>
+              <a:ext uri="{FF2B5EF4-FFF2-40B4-BE49-F238E27FC236}">
+                <a16:creationId xmlns:a16="http://schemas.microsoft.com/office/drawing/2014/main" id="{ECD09B8B-A276-F777-FB49-E6021A793571}"/>
+              </a:ext>
+            </a:extLst>
+          </p:cNvPr>
+          <p:cNvPicPr>
+            <a:picLocks noChangeAspect="1"/>
+          </p:cNvPicPr>
+          <p:nvPr/>
+        </p:nvPicPr>
+        <p:blipFill>
+          <a:blip r:embed="rId4"/>
+          <a:stretch>
+            <a:fillRect/>
+          </a:stretch>
+        </p:blipFill>
+        <p:spPr>
+          <a:xfrm>
+            <a:off x="2589212" y="3425536"/>
+            <a:ext cx="8657143" cy="2714286"/>
+          </a:xfrm>
+          <a:prstGeom prst="rect">
+            <a:avLst/>
+          </a:prstGeom>
+        </p:spPr>
+      </p:pic>
+    </p:spTree>
+    <p:extLst>
+      <p:ext uri="{BB962C8B-B14F-4D97-AF65-F5344CB8AC3E}">
+        <p14:creationId xmlns:p14="http://schemas.microsoft.com/office/powerpoint/2010/main" val="3676807034"/>
+      </p:ext>
+    </p:extLst>
+  </p:cSld>
+  <p:clrMapOvr>
+    <a:masterClrMapping/>
+  </p:clrMapOvr>
+</p:sld>
+</file>
+
+<file path=ppt/slides/slide24.xml><?xml version="1.0" encoding="utf-8"?>
+<p:sld xmlns:a="http://schemas.openxmlformats.org/drawingml/2006/main" xmlns:r="http://schemas.openxmlformats.org/officeDocument/2006/relationships" xmlns:p="http://schemas.openxmlformats.org/presentationml/2006/main">
+  <p:cSld>
+    <p:spTree>
+      <p:nvGrpSpPr>
+        <p:cNvPr id="1" name=""/>
+        <p:cNvGrpSpPr/>
+        <p:nvPr/>
+      </p:nvGrpSpPr>
+      <p:grpSpPr>
+        <a:xfrm>
+          <a:off x="0" y="0"/>
+          <a:ext cx="0" cy="0"/>
+          <a:chOff x="0" y="0"/>
+          <a:chExt cx="0" cy="0"/>
+        </a:xfrm>
+      </p:grpSpPr>
+      <p:sp>
+        <p:nvSpPr>
+          <p:cNvPr id="5" name="Text Placeholder 4">
+            <a:extLst>
+              <a:ext uri="{FF2B5EF4-FFF2-40B4-BE49-F238E27FC236}">
+                <a16:creationId xmlns:a16="http://schemas.microsoft.com/office/drawing/2014/main" id="{C7F27646-2448-4E88-B0E9-87A6A01DB3E7}"/>
+              </a:ext>
+            </a:extLst>
+          </p:cNvPr>
+          <p:cNvSpPr>
+            <a:spLocks noGrp="1"/>
+          </p:cNvSpPr>
+          <p:nvPr>
+            <p:ph type="body" idx="1"/>
+          </p:nvPr>
+        </p:nvSpPr>
+        <p:spPr>
+          <a:xfrm>
+            <a:off x="3373062" y="4127644"/>
+            <a:ext cx="8131550" cy="1126283"/>
+          </a:xfrm>
+        </p:spPr>
+        <p:txBody>
+          <a:bodyPr vert="horz" lIns="91440" tIns="45720" rIns="91440" bIns="45720" rtlCol="0" anchor="t">
+            <a:normAutofit/>
+          </a:bodyPr>
+          <a:lstStyle/>
+          <a:p>
+            <a:r>
+              <a:rPr lang="en-US" sz="1800" dirty="0"/>
+              <a:t>Demo</a:t>
+            </a:r>
+          </a:p>
+        </p:txBody>
+      </p:sp>
+      <p:sp>
+        <p:nvSpPr>
+          <p:cNvPr id="7" name="Title 6">
+            <a:extLst>
+              <a:ext uri="{FF2B5EF4-FFF2-40B4-BE49-F238E27FC236}">
+                <a16:creationId xmlns:a16="http://schemas.microsoft.com/office/drawing/2014/main" id="{9D7458E8-05E9-493E-B7CC-F1AF9139D7CB}"/>
+              </a:ext>
+            </a:extLst>
+          </p:cNvPr>
+          <p:cNvSpPr>
+            <a:spLocks noGrp="1"/>
+          </p:cNvSpPr>
+          <p:nvPr>
+            <p:ph type="title"/>
+          </p:nvPr>
+        </p:nvSpPr>
+        <p:spPr>
+          <a:xfrm>
+            <a:off x="3373062" y="1864865"/>
+            <a:ext cx="8131550" cy="2262781"/>
+          </a:xfrm>
+        </p:spPr>
+        <p:txBody>
+          <a:bodyPr vert="horz" lIns="91440" tIns="45720" rIns="91440" bIns="45720" rtlCol="0" anchor="b">
+            <a:normAutofit/>
+          </a:bodyPr>
+          <a:lstStyle/>
+          <a:p>
+            <a:r>
+              <a:rPr lang="en-US" sz="5400" dirty="0"/>
+              <a:t>Send live telemetry to the IoT Hub</a:t>
+            </a:r>
+          </a:p>
+        </p:txBody>
+      </p:sp>
+    </p:spTree>
+    <p:extLst>
+      <p:ext uri="{BB962C8B-B14F-4D97-AF65-F5344CB8AC3E}">
+        <p14:creationId xmlns:p14="http://schemas.microsoft.com/office/powerpoint/2010/main" val="2801188615"/>
+      </p:ext>
+    </p:extLst>
+  </p:cSld>
+  <p:clrMapOvr>
+    <a:masterClrMapping/>
+  </p:clrMapOvr>
+</p:sld>
+</file>
+
+<file path=ppt/slides/slide25.xml><?xml version="1.0" encoding="utf-8"?>
+<p:sld xmlns:a="http://schemas.openxmlformats.org/drawingml/2006/main" xmlns:r="http://schemas.openxmlformats.org/officeDocument/2006/relationships" xmlns:p="http://schemas.openxmlformats.org/presentationml/2006/main">
+  <p:cSld>
+    <p:spTree>
+      <p:nvGrpSpPr>
+        <p:cNvPr id="1" name=""/>
+        <p:cNvGrpSpPr/>
+        <p:nvPr/>
+      </p:nvGrpSpPr>
+      <p:grpSpPr>
+        <a:xfrm>
+          <a:off x="0" y="0"/>
+          <a:ext cx="0" cy="0"/>
+          <a:chOff x="0" y="0"/>
+          <a:chExt cx="0" cy="0"/>
+        </a:xfrm>
+      </p:grpSpPr>
+      <p:sp>
+        <p:nvSpPr>
           <p:cNvPr id="2" name="Title 1">
             <a:extLst>
               <a:ext uri="{FF2B5EF4-FFF2-40B4-BE49-F238E27FC236}">
@@ -19656,7 +20854,7 @@
 </p:sld>
 </file>
 
-<file path=ppt/slides/slide21.xml><?xml version="1.0" encoding="utf-8"?>
+<file path=ppt/slides/slide26.xml><?xml version="1.0" encoding="utf-8"?>
 <p:sld xmlns:a="http://schemas.openxmlformats.org/drawingml/2006/main" xmlns:r="http://schemas.openxmlformats.org/officeDocument/2006/relationships" xmlns:p="http://schemas.openxmlformats.org/presentationml/2006/main">
   <p:cSld>
     <p:bg>
@@ -22343,7 +23541,7 @@
 </p:sld>
 </file>
 
-<file path=ppt/slides/slide22.xml><?xml version="1.0" encoding="utf-8"?>
+<file path=ppt/slides/slide27.xml><?xml version="1.0" encoding="utf-8"?>
 <p:sld xmlns:a="http://schemas.openxmlformats.org/drawingml/2006/main" xmlns:r="http://schemas.openxmlformats.org/officeDocument/2006/relationships" xmlns:p="http://schemas.openxmlformats.org/presentationml/2006/main">
   <p:cSld>
     <p:spTree>
@@ -22437,7 +23635,7 @@
         </p:nvSpPr>
         <p:spPr>
           <a:xfrm>
-            <a:off x="807768" y="3895201"/>
+            <a:off x="1289027" y="3987693"/>
             <a:ext cx="6096000" cy="369332"/>
           </a:xfrm>
           <a:prstGeom prst="rect">
@@ -25580,7 +26778,7 @@
           <a:p>
             <a:r>
               <a:rPr lang="en-US" sz="5400" dirty="0"/>
-              <a:t>Create an IoT Hub</a:t>
+              <a:t>Explore an IoT Hub</a:t>
             </a:r>
           </a:p>
         </p:txBody>
@@ -28145,6 +29343,136 @@
 <file path=ppt/slides/slide8.xml><?xml version="1.0" encoding="utf-8"?>
 <p:sld xmlns:a="http://schemas.openxmlformats.org/drawingml/2006/main" xmlns:r="http://schemas.openxmlformats.org/officeDocument/2006/relationships" xmlns:p="http://schemas.openxmlformats.org/presentationml/2006/main">
   <p:cSld>
+    <p:spTree>
+      <p:nvGrpSpPr>
+        <p:cNvPr id="1" name=""/>
+        <p:cNvGrpSpPr/>
+        <p:nvPr/>
+      </p:nvGrpSpPr>
+      <p:grpSpPr>
+        <a:xfrm>
+          <a:off x="0" y="0"/>
+          <a:ext cx="0" cy="0"/>
+          <a:chOff x="0" y="0"/>
+          <a:chExt cx="0" cy="0"/>
+        </a:xfrm>
+      </p:grpSpPr>
+      <p:sp>
+        <p:nvSpPr>
+          <p:cNvPr id="4" name="Title 3">
+            <a:extLst>
+              <a:ext uri="{FF2B5EF4-FFF2-40B4-BE49-F238E27FC236}">
+                <a16:creationId xmlns:a16="http://schemas.microsoft.com/office/drawing/2014/main" id="{B4060808-6A98-1CDD-5CEC-57D462A3FFE9}"/>
+              </a:ext>
+            </a:extLst>
+          </p:cNvPr>
+          <p:cNvSpPr>
+            <a:spLocks noGrp="1"/>
+          </p:cNvSpPr>
+          <p:nvPr>
+            <p:ph type="title"/>
+          </p:nvPr>
+        </p:nvSpPr>
+        <p:spPr/>
+        <p:txBody>
+          <a:bodyPr/>
+          <a:lstStyle/>
+          <a:p>
+            <a:r>
+              <a:rPr lang="en-US" dirty="0"/>
+              <a:t>Azure IoT Explorer</a:t>
+            </a:r>
+          </a:p>
+        </p:txBody>
+      </p:sp>
+      <p:sp>
+        <p:nvSpPr>
+          <p:cNvPr id="5" name="Content Placeholder 4">
+            <a:extLst>
+              <a:ext uri="{FF2B5EF4-FFF2-40B4-BE49-F238E27FC236}">
+                <a16:creationId xmlns:a16="http://schemas.microsoft.com/office/drawing/2014/main" id="{61525985-3D9F-E515-CC96-DAA1BA8580E8}"/>
+              </a:ext>
+            </a:extLst>
+          </p:cNvPr>
+          <p:cNvSpPr>
+            <a:spLocks noGrp="1"/>
+          </p:cNvSpPr>
+          <p:nvPr>
+            <p:ph idx="1"/>
+          </p:nvPr>
+        </p:nvSpPr>
+        <p:spPr>
+          <a:xfrm>
+            <a:off x="2592925" y="1540189"/>
+            <a:ext cx="8915400" cy="3777622"/>
+          </a:xfrm>
+        </p:spPr>
+        <p:txBody>
+          <a:bodyPr/>
+          <a:lstStyle/>
+          <a:p>
+            <a:r>
+              <a:rPr lang="en-US" dirty="0">
+                <a:hlinkClick r:id="rId3"/>
+              </a:rPr>
+              <a:t>https://docs.microsoft.com/en-us/azure/iot-fundamentals/howto-use-iot-explorer</a:t>
+            </a:r>
+            <a:endParaRPr lang="en-US" dirty="0"/>
+          </a:p>
+          <a:p>
+            <a:pPr marL="0" indent="0">
+              <a:buNone/>
+            </a:pPr>
+            <a:endParaRPr lang="en-US" dirty="0"/>
+          </a:p>
+        </p:txBody>
+      </p:sp>
+      <p:pic>
+        <p:nvPicPr>
+          <p:cNvPr id="7" name="Picture 6">
+            <a:extLst>
+              <a:ext uri="{FF2B5EF4-FFF2-40B4-BE49-F238E27FC236}">
+                <a16:creationId xmlns:a16="http://schemas.microsoft.com/office/drawing/2014/main" id="{C6D28D7F-C83B-C3F0-C016-F2E7D23ACBD2}"/>
+              </a:ext>
+            </a:extLst>
+          </p:cNvPr>
+          <p:cNvPicPr>
+            <a:picLocks noChangeAspect="1"/>
+          </p:cNvPicPr>
+          <p:nvPr/>
+        </p:nvPicPr>
+        <p:blipFill>
+          <a:blip r:embed="rId4"/>
+          <a:stretch>
+            <a:fillRect/>
+          </a:stretch>
+        </p:blipFill>
+        <p:spPr>
+          <a:xfrm>
+            <a:off x="4857750" y="2210827"/>
+            <a:ext cx="6646862" cy="4503520"/>
+          </a:xfrm>
+          <a:prstGeom prst="rect">
+            <a:avLst/>
+          </a:prstGeom>
+        </p:spPr>
+      </p:pic>
+    </p:spTree>
+    <p:extLst>
+      <p:ext uri="{BB962C8B-B14F-4D97-AF65-F5344CB8AC3E}">
+        <p14:creationId xmlns:p14="http://schemas.microsoft.com/office/powerpoint/2010/main" val="3049031791"/>
+      </p:ext>
+    </p:extLst>
+  </p:cSld>
+  <p:clrMapOvr>
+    <a:masterClrMapping/>
+  </p:clrMapOvr>
+</p:sld>
+</file>
+
+<file path=ppt/slides/slide9.xml><?xml version="1.0" encoding="utf-8"?>
+<p:sld xmlns:a="http://schemas.openxmlformats.org/drawingml/2006/main" xmlns:r="http://schemas.openxmlformats.org/officeDocument/2006/relationships" xmlns:p="http://schemas.openxmlformats.org/presentationml/2006/main">
+  <p:cSld>
     <p:bg>
       <p:bgPr>
         <a:gradFill rotWithShape="1">
@@ -33013,89 +34341,6 @@
     <p:extLst>
       <p:ext uri="{BB962C8B-B14F-4D97-AF65-F5344CB8AC3E}">
         <p14:creationId xmlns:p14="http://schemas.microsoft.com/office/powerpoint/2010/main" val="830820308"/>
-      </p:ext>
-    </p:extLst>
-  </p:cSld>
-  <p:clrMapOvr>
-    <a:masterClrMapping/>
-  </p:clrMapOvr>
-</p:sld>
-</file>
-
-<file path=ppt/slides/slide9.xml><?xml version="1.0" encoding="utf-8"?>
-<p:sld xmlns:a="http://schemas.openxmlformats.org/drawingml/2006/main" xmlns:r="http://schemas.openxmlformats.org/officeDocument/2006/relationships" xmlns:p="http://schemas.openxmlformats.org/presentationml/2006/main">
-  <p:cSld>
-    <p:spTree>
-      <p:nvGrpSpPr>
-        <p:cNvPr id="1" name=""/>
-        <p:cNvGrpSpPr/>
-        <p:nvPr/>
-      </p:nvGrpSpPr>
-      <p:grpSpPr>
-        <a:xfrm>
-          <a:off x="0" y="0"/>
-          <a:ext cx="0" cy="0"/>
-          <a:chOff x="0" y="0"/>
-          <a:chExt cx="0" cy="0"/>
-        </a:xfrm>
-      </p:grpSpPr>
-      <p:sp>
-        <p:nvSpPr>
-          <p:cNvPr id="6" name="Title 5">
-            <a:extLst>
-              <a:ext uri="{FF2B5EF4-FFF2-40B4-BE49-F238E27FC236}">
-                <a16:creationId xmlns:a16="http://schemas.microsoft.com/office/drawing/2014/main" id="{ED6ABB4B-1B8A-455F-9E7E-7D86AAC143FA}"/>
-              </a:ext>
-            </a:extLst>
-          </p:cNvPr>
-          <p:cNvSpPr>
-            <a:spLocks noGrp="1"/>
-          </p:cNvSpPr>
-          <p:nvPr>
-            <p:ph type="title"/>
-          </p:nvPr>
-        </p:nvSpPr>
-        <p:spPr/>
-        <p:txBody>
-          <a:bodyPr/>
-          <a:lstStyle/>
-          <a:p>
-            <a:r>
-              <a:rPr lang="en-US" dirty="0"/>
-              <a:t>Device Provisioning Service (DPS)</a:t>
-            </a:r>
-          </a:p>
-        </p:txBody>
-      </p:sp>
-      <p:sp>
-        <p:nvSpPr>
-          <p:cNvPr id="7" name="Text Placeholder 6">
-            <a:extLst>
-              <a:ext uri="{FF2B5EF4-FFF2-40B4-BE49-F238E27FC236}">
-                <a16:creationId xmlns:a16="http://schemas.microsoft.com/office/drawing/2014/main" id="{CF846C4E-3E11-43D4-8C54-B8734AC80D5D}"/>
-              </a:ext>
-            </a:extLst>
-          </p:cNvPr>
-          <p:cNvSpPr>
-            <a:spLocks noGrp="1"/>
-          </p:cNvSpPr>
-          <p:nvPr>
-            <p:ph type="body" idx="1"/>
-          </p:nvPr>
-        </p:nvSpPr>
-        <p:spPr/>
-        <p:txBody>
-          <a:bodyPr/>
-          <a:lstStyle/>
-          <a:p>
-            <a:endParaRPr lang="en-US"/>
-          </a:p>
-        </p:txBody>
-      </p:sp>
-    </p:spTree>
-    <p:extLst>
-      <p:ext uri="{BB962C8B-B14F-4D97-AF65-F5344CB8AC3E}">
-        <p14:creationId xmlns:p14="http://schemas.microsoft.com/office/powerpoint/2010/main" val="3142814330"/>
       </p:ext>
     </p:extLst>
   </p:cSld>

</xml_diff>